<commit_message>
Overview and Seeding Fake Data
</commit_message>
<xml_diff>
--- a/.lessons/15 Fundamental Database - Migration and Seeding/6 Overview and Seeding Fake Data/1.pptx
+++ b/.lessons/15 Fundamental Database - Migration and Seeding/6 Overview and Seeding Fake Data/1.pptx
@@ -7,6 +7,15 @@
   <p:sldIdLst>
     <p:sldId id="385" r:id="rId2"/>
     <p:sldId id="386" r:id="rId3"/>
+    <p:sldId id="387" r:id="rId4"/>
+    <p:sldId id="388" r:id="rId5"/>
+    <p:sldId id="390" r:id="rId6"/>
+    <p:sldId id="392" r:id="rId7"/>
+    <p:sldId id="389" r:id="rId8"/>
+    <p:sldId id="393" r:id="rId9"/>
+    <p:sldId id="391" r:id="rId10"/>
+    <p:sldId id="396" r:id="rId11"/>
+    <p:sldId id="397" r:id="rId12"/>
   </p:sldIdLst>
   <p:sldSz cx="12192000" cy="6858000"/>
   <p:notesSz cx="6858000" cy="9144000"/>
@@ -260,7 +269,7 @@
           <a:p>
             <a:fld id="{3E102D2E-813C-461C-9963-687A650C48C0}" type="datetimeFigureOut">
               <a:rPr lang="en-US" smtClean="0"/>
-              <a:t>4/21/2025</a:t>
+              <a:t>4/22/2025</a:t>
             </a:fld>
             <a:endParaRPr lang="en-US"/>
           </a:p>
@@ -458,7 +467,7 @@
           <a:p>
             <a:fld id="{3E102D2E-813C-461C-9963-687A650C48C0}" type="datetimeFigureOut">
               <a:rPr lang="en-US" smtClean="0"/>
-              <a:t>4/21/2025</a:t>
+              <a:t>4/22/2025</a:t>
             </a:fld>
             <a:endParaRPr lang="en-US"/>
           </a:p>
@@ -666,7 +675,7 @@
           <a:p>
             <a:fld id="{3E102D2E-813C-461C-9963-687A650C48C0}" type="datetimeFigureOut">
               <a:rPr lang="en-US" smtClean="0"/>
-              <a:t>4/21/2025</a:t>
+              <a:t>4/22/2025</a:t>
             </a:fld>
             <a:endParaRPr lang="en-US"/>
           </a:p>
@@ -864,7 +873,7 @@
           <a:p>
             <a:fld id="{3E102D2E-813C-461C-9963-687A650C48C0}" type="datetimeFigureOut">
               <a:rPr lang="en-US" smtClean="0"/>
-              <a:t>4/21/2025</a:t>
+              <a:t>4/22/2025</a:t>
             </a:fld>
             <a:endParaRPr lang="en-US"/>
           </a:p>
@@ -1139,7 +1148,7 @@
           <a:p>
             <a:fld id="{3E102D2E-813C-461C-9963-687A650C48C0}" type="datetimeFigureOut">
               <a:rPr lang="en-US" smtClean="0"/>
-              <a:t>4/21/2025</a:t>
+              <a:t>4/22/2025</a:t>
             </a:fld>
             <a:endParaRPr lang="en-US"/>
           </a:p>
@@ -1404,7 +1413,7 @@
           <a:p>
             <a:fld id="{3E102D2E-813C-461C-9963-687A650C48C0}" type="datetimeFigureOut">
               <a:rPr lang="en-US" smtClean="0"/>
-              <a:t>4/21/2025</a:t>
+              <a:t>4/22/2025</a:t>
             </a:fld>
             <a:endParaRPr lang="en-US"/>
           </a:p>
@@ -1816,7 +1825,7 @@
           <a:p>
             <a:fld id="{3E102D2E-813C-461C-9963-687A650C48C0}" type="datetimeFigureOut">
               <a:rPr lang="en-US" smtClean="0"/>
-              <a:t>4/21/2025</a:t>
+              <a:t>4/22/2025</a:t>
             </a:fld>
             <a:endParaRPr lang="en-US"/>
           </a:p>
@@ -1957,7 +1966,7 @@
           <a:p>
             <a:fld id="{3E102D2E-813C-461C-9963-687A650C48C0}" type="datetimeFigureOut">
               <a:rPr lang="en-US" smtClean="0"/>
-              <a:t>4/21/2025</a:t>
+              <a:t>4/22/2025</a:t>
             </a:fld>
             <a:endParaRPr lang="en-US"/>
           </a:p>
@@ -2070,7 +2079,7 @@
           <a:p>
             <a:fld id="{3E102D2E-813C-461C-9963-687A650C48C0}" type="datetimeFigureOut">
               <a:rPr lang="en-US" smtClean="0"/>
-              <a:t>4/21/2025</a:t>
+              <a:t>4/22/2025</a:t>
             </a:fld>
             <a:endParaRPr lang="en-US"/>
           </a:p>
@@ -2381,7 +2390,7 @@
           <a:p>
             <a:fld id="{3E102D2E-813C-461C-9963-687A650C48C0}" type="datetimeFigureOut">
               <a:rPr lang="en-US" smtClean="0"/>
-              <a:t>4/21/2025</a:t>
+              <a:t>4/22/2025</a:t>
             </a:fld>
             <a:endParaRPr lang="en-US"/>
           </a:p>
@@ -2669,7 +2678,7 @@
           <a:p>
             <a:fld id="{3E102D2E-813C-461C-9963-687A650C48C0}" type="datetimeFigureOut">
               <a:rPr lang="en-US" smtClean="0"/>
-              <a:t>4/21/2025</a:t>
+              <a:t>4/22/2025</a:t>
             </a:fld>
             <a:endParaRPr lang="en-US"/>
           </a:p>
@@ -2910,7 +2919,7 @@
           <a:p>
             <a:fld id="{3E102D2E-813C-461C-9963-687A650C48C0}" type="datetimeFigureOut">
               <a:rPr lang="en-US" smtClean="0"/>
-              <a:t>4/21/2025</a:t>
+              <a:t>4/22/2025</a:t>
             </a:fld>
             <a:endParaRPr lang="en-US"/>
           </a:p>
@@ -3348,6 +3357,575 @@
         <p:spPr>
           <a:xfrm>
             <a:off x="217714" y="255046"/>
+            <a:ext cx="11756571" cy="3402342"/>
+          </a:xfrm>
+          <a:prstGeom prst="rect">
+            <a:avLst/>
+          </a:prstGeom>
+          <a:noFill/>
+        </p:spPr>
+        <p:txBody>
+          <a:bodyPr wrap="square">
+            <a:spAutoFit/>
+          </a:bodyPr>
+          <a:lstStyle/>
+          <a:p>
+            <a:pPr>
+              <a:lnSpc>
+                <a:spcPct val="150000"/>
+              </a:lnSpc>
+              <a:buNone/>
+            </a:pPr>
+            <a:r>
+              <a:rPr lang="az-Latn-AZ" sz="1400"/>
+              <a:t>A</a:t>
+            </a:r>
+            <a:r>
+              <a:rPr lang="en-US" sz="1400"/>
+              <a:t>rtıq </a:t>
+            </a:r>
+            <a:r>
+              <a:rPr lang="en-US" sz="1400" b="1">
+                <a:solidFill>
+                  <a:srgbClr val="FF0000"/>
+                </a:solidFill>
+              </a:rPr>
+              <a:t>Laravel Seeder</a:t>
+            </a:r>
+            <a:r>
+              <a:rPr lang="en-US" sz="1400">
+                <a:solidFill>
+                  <a:srgbClr val="FF0000"/>
+                </a:solidFill>
+              </a:rPr>
+              <a:t> </a:t>
+            </a:r>
+            <a:r>
+              <a:rPr lang="en-US" sz="1400"/>
+              <a:t>mövzusunu</a:t>
+            </a:r>
+            <a:r>
+              <a:rPr lang="az-Latn-AZ" sz="1400"/>
+              <a:t> keçə bilərik. </a:t>
+            </a:r>
+          </a:p>
+          <a:p>
+            <a:pPr>
+              <a:lnSpc>
+                <a:spcPct val="150000"/>
+              </a:lnSpc>
+              <a:buNone/>
+            </a:pPr>
+            <a:endParaRPr kumimoji="0" lang="az-Latn-AZ" altLang="en-US" sz="1400" b="0" i="0" u="none" strike="noStrike" cap="none" normalizeH="0" baseline="0">
+              <a:ln>
+                <a:noFill/>
+              </a:ln>
+              <a:solidFill>
+                <a:schemeClr val="tx1"/>
+              </a:solidFill>
+              <a:effectLst/>
+              <a:latin typeface="Arial" panose="020B0604020202020204" pitchFamily="34" charset="0"/>
+            </a:endParaRPr>
+          </a:p>
+          <a:p>
+            <a:pPr>
+              <a:lnSpc>
+                <a:spcPct val="150000"/>
+              </a:lnSpc>
+              <a:buNone/>
+            </a:pPr>
+            <a:r>
+              <a:rPr kumimoji="0" lang="en-US" altLang="en-US" sz="1300" b="1" i="0" u="none" strike="noStrike" cap="none" normalizeH="0" baseline="0">
+                <a:ln>
+                  <a:noFill/>
+                </a:ln>
+                <a:solidFill>
+                  <a:schemeClr val="tx1"/>
+                </a:solidFill>
+                <a:effectLst/>
+                <a:latin typeface="Arial" panose="020B0604020202020204" pitchFamily="34" charset="0"/>
+              </a:rPr>
+              <a:t>Seeder</a:t>
+            </a:r>
+            <a:r>
+              <a:rPr kumimoji="0" lang="en-US" altLang="en-US" sz="1300" b="0" i="0" u="none" strike="noStrike" cap="none" normalizeH="0" baseline="0">
+                <a:ln>
+                  <a:noFill/>
+                </a:ln>
+                <a:solidFill>
+                  <a:schemeClr val="tx1"/>
+                </a:solidFill>
+                <a:effectLst/>
+                <a:latin typeface="Arial" panose="020B0604020202020204" pitchFamily="34" charset="0"/>
+              </a:rPr>
+              <a:t>-l</a:t>
+            </a:r>
+            <a:r>
+              <a:rPr kumimoji="0" lang="az-Latn-AZ" altLang="en-US" sz="1300" b="0" i="0" u="none" strike="noStrike" cap="none" normalizeH="0" baseline="0">
+                <a:ln>
+                  <a:noFill/>
+                </a:ln>
+                <a:solidFill>
+                  <a:schemeClr val="tx1"/>
+                </a:solidFill>
+                <a:effectLst/>
+                <a:latin typeface="Arial" panose="020B0604020202020204" pitchFamily="34" charset="0"/>
+              </a:rPr>
+              <a:t>a</a:t>
+            </a:r>
+            <a:r>
+              <a:rPr kumimoji="0" lang="en-US" altLang="en-US" sz="1300" b="0" i="0" u="none" strike="noStrike" cap="none" normalizeH="0" baseline="0">
+                <a:ln>
+                  <a:noFill/>
+                </a:ln>
+                <a:solidFill>
+                  <a:schemeClr val="tx1"/>
+                </a:solidFill>
+                <a:effectLst/>
+                <a:latin typeface="Arial" panose="020B0604020202020204" pitchFamily="34" charset="0"/>
+              </a:rPr>
+              <a:t>r Laravel-də verilənlər bazasına test məlumatı əlavə etmək üçün istifadə olunan mexanizmdir.</a:t>
+            </a:r>
+          </a:p>
+          <a:p>
+            <a:pPr>
+              <a:lnSpc>
+                <a:spcPct val="150000"/>
+              </a:lnSpc>
+              <a:buNone/>
+            </a:pPr>
+            <a:endParaRPr kumimoji="0" lang="en-US" altLang="en-US" sz="1300" b="0" i="0" u="none" strike="noStrike" cap="none" normalizeH="0" baseline="0">
+              <a:ln>
+                <a:noFill/>
+              </a:ln>
+              <a:solidFill>
+                <a:schemeClr val="tx1"/>
+              </a:solidFill>
+              <a:effectLst/>
+              <a:latin typeface="Arial" panose="020B0604020202020204" pitchFamily="34" charset="0"/>
+            </a:endParaRPr>
+          </a:p>
+          <a:p>
+            <a:pPr>
+              <a:lnSpc>
+                <a:spcPct val="150000"/>
+              </a:lnSpc>
+              <a:buNone/>
+            </a:pPr>
+            <a:r>
+              <a:rPr kumimoji="0" lang="en-US" altLang="en-US" sz="1300" b="1" i="0" u="none" strike="noStrike" cap="none" normalizeH="0" baseline="0">
+                <a:ln>
+                  <a:noFill/>
+                </a:ln>
+                <a:solidFill>
+                  <a:schemeClr val="tx1"/>
+                </a:solidFill>
+                <a:effectLst/>
+                <a:latin typeface="Arial" panose="020B0604020202020204" pitchFamily="34" charset="0"/>
+              </a:rPr>
+              <a:t>Əsas məqsəd</a:t>
+            </a:r>
+            <a:r>
+              <a:rPr kumimoji="0" lang="en-US" altLang="en-US" sz="1300" b="0" i="0" u="none" strike="noStrike" cap="none" normalizeH="0" baseline="0">
+                <a:ln>
+                  <a:noFill/>
+                </a:ln>
+                <a:solidFill>
+                  <a:schemeClr val="tx1"/>
+                </a:solidFill>
+                <a:effectLst/>
+                <a:latin typeface="Arial" panose="020B0604020202020204" pitchFamily="34" charset="0"/>
+              </a:rPr>
+              <a:t>: Development və test mərhələsində əl ilə məlumat yazmaq yerinə, avtomatik kodla məlumat əlavə etmək.</a:t>
+            </a:r>
+          </a:p>
+          <a:p>
+            <a:pPr>
+              <a:lnSpc>
+                <a:spcPct val="150000"/>
+              </a:lnSpc>
+              <a:buNone/>
+            </a:pPr>
+            <a:endParaRPr kumimoji="0" lang="en-US" altLang="en-US" sz="1300" b="0" i="0" u="none" strike="noStrike" cap="none" normalizeH="0" baseline="0">
+              <a:ln>
+                <a:noFill/>
+              </a:ln>
+              <a:solidFill>
+                <a:schemeClr val="tx1"/>
+              </a:solidFill>
+              <a:effectLst/>
+              <a:latin typeface="Arial" panose="020B0604020202020204" pitchFamily="34" charset="0"/>
+            </a:endParaRPr>
+          </a:p>
+          <a:p>
+            <a:pPr>
+              <a:lnSpc>
+                <a:spcPct val="150000"/>
+              </a:lnSpc>
+              <a:buNone/>
+            </a:pPr>
+            <a:r>
+              <a:rPr kumimoji="0" lang="en-US" altLang="en-US" sz="1300" b="0" i="0" u="none" strike="noStrike" cap="none" normalizeH="0" baseline="0">
+                <a:ln>
+                  <a:noFill/>
+                </a:ln>
+                <a:solidFill>
+                  <a:schemeClr val="tx1"/>
+                </a:solidFill>
+                <a:effectLst/>
+                <a:latin typeface="Arial" panose="020B0604020202020204" pitchFamily="34" charset="0"/>
+              </a:rPr>
+              <a:t>1️⃣ </a:t>
+            </a:r>
+            <a:r>
+              <a:rPr kumimoji="0" lang="en-US" altLang="en-US" sz="1300" b="1" i="0" u="none" strike="noStrike" cap="none" normalizeH="0" baseline="0">
+                <a:ln>
+                  <a:noFill/>
+                </a:ln>
+                <a:solidFill>
+                  <a:srgbClr val="FF0000"/>
+                </a:solidFill>
+                <a:effectLst/>
+                <a:latin typeface="Arial" panose="020B0604020202020204" pitchFamily="34" charset="0"/>
+              </a:rPr>
+              <a:t>php artisan make:seeder PostSeeder</a:t>
+            </a:r>
+          </a:p>
+          <a:p>
+            <a:pPr>
+              <a:lnSpc>
+                <a:spcPct val="150000"/>
+              </a:lnSpc>
+              <a:buNone/>
+            </a:pPr>
+            <a:endParaRPr kumimoji="0" lang="en-US" altLang="en-US" sz="1300" b="0" i="0" u="none" strike="noStrike" cap="none" normalizeH="0" baseline="0">
+              <a:ln>
+                <a:noFill/>
+              </a:ln>
+              <a:solidFill>
+                <a:schemeClr val="tx1"/>
+              </a:solidFill>
+              <a:effectLst/>
+              <a:latin typeface="Arial" panose="020B0604020202020204" pitchFamily="34" charset="0"/>
+            </a:endParaRPr>
+          </a:p>
+          <a:p>
+            <a:pPr>
+              <a:lnSpc>
+                <a:spcPct val="150000"/>
+              </a:lnSpc>
+              <a:buNone/>
+            </a:pPr>
+            <a:r>
+              <a:rPr kumimoji="0" lang="en-US" altLang="en-US" sz="1300" b="0" i="0" u="none" strike="noStrike" cap="none" normalizeH="0" baseline="0">
+                <a:ln>
+                  <a:noFill/>
+                </a:ln>
+                <a:solidFill>
+                  <a:schemeClr val="tx1"/>
+                </a:solidFill>
+                <a:effectLst/>
+                <a:latin typeface="Arial" panose="020B0604020202020204" pitchFamily="34" charset="0"/>
+              </a:rPr>
+              <a:t>Bu əmr: </a:t>
+            </a:r>
+            <a:r>
+              <a:rPr kumimoji="0" lang="en-US" altLang="en-US" sz="1300" b="1" i="0" u="none" strike="noStrike" cap="none" normalizeH="0" baseline="0">
+                <a:ln>
+                  <a:noFill/>
+                </a:ln>
+                <a:solidFill>
+                  <a:srgbClr val="00B050"/>
+                </a:solidFill>
+                <a:effectLst/>
+                <a:latin typeface="Arial" panose="020B0604020202020204" pitchFamily="34" charset="0"/>
+              </a:rPr>
+              <a:t>database/seeders </a:t>
+            </a:r>
+            <a:r>
+              <a:rPr kumimoji="0" lang="en-US" altLang="en-US" sz="1300" b="0" i="0" u="none" strike="noStrike" cap="none" normalizeH="0" baseline="0">
+                <a:ln>
+                  <a:noFill/>
+                </a:ln>
+                <a:solidFill>
+                  <a:schemeClr val="tx1"/>
+                </a:solidFill>
+                <a:effectLst/>
+                <a:latin typeface="Arial" panose="020B0604020202020204" pitchFamily="34" charset="0"/>
+              </a:rPr>
+              <a:t>qovluğunda </a:t>
+            </a:r>
+            <a:r>
+              <a:rPr kumimoji="0" lang="en-US" altLang="en-US" sz="1300" b="1" i="0" u="none" strike="noStrike" cap="none" normalizeH="0" baseline="0">
+                <a:ln>
+                  <a:noFill/>
+                </a:ln>
+                <a:solidFill>
+                  <a:schemeClr val="tx1"/>
+                </a:solidFill>
+                <a:effectLst/>
+                <a:latin typeface="Arial" panose="020B0604020202020204" pitchFamily="34" charset="0"/>
+              </a:rPr>
+              <a:t>PostSeeder.php </a:t>
+            </a:r>
+            <a:r>
+              <a:rPr kumimoji="0" lang="en-US" altLang="en-US" sz="1300" b="0" i="0" u="none" strike="noStrike" cap="none" normalizeH="0" baseline="0">
+                <a:ln>
+                  <a:noFill/>
+                </a:ln>
+                <a:solidFill>
+                  <a:schemeClr val="tx1"/>
+                </a:solidFill>
+                <a:effectLst/>
+                <a:latin typeface="Arial" panose="020B0604020202020204" pitchFamily="34" charset="0"/>
+              </a:rPr>
+              <a:t>adlı bir </a:t>
+            </a:r>
+            <a:r>
+              <a:rPr kumimoji="0" lang="en-US" altLang="en-US" sz="1300" b="1" i="0" u="none" strike="noStrike" cap="none" normalizeH="0" baseline="0">
+                <a:ln>
+                  <a:noFill/>
+                </a:ln>
+                <a:solidFill>
+                  <a:schemeClr val="tx1"/>
+                </a:solidFill>
+                <a:effectLst/>
+                <a:latin typeface="Arial" panose="020B0604020202020204" pitchFamily="34" charset="0"/>
+              </a:rPr>
+              <a:t>Seeder</a:t>
+            </a:r>
+            <a:r>
+              <a:rPr kumimoji="0" lang="en-US" altLang="en-US" sz="1300" b="0" i="0" u="none" strike="noStrike" cap="none" normalizeH="0" baseline="0">
+                <a:ln>
+                  <a:noFill/>
+                </a:ln>
+                <a:solidFill>
+                  <a:schemeClr val="tx1"/>
+                </a:solidFill>
+                <a:effectLst/>
+                <a:latin typeface="Arial" panose="020B0604020202020204" pitchFamily="34" charset="0"/>
+              </a:rPr>
+              <a:t> </a:t>
+            </a:r>
+            <a:r>
+              <a:rPr kumimoji="0" lang="az-Latn-AZ" altLang="en-US" sz="1300" b="0" i="0" u="none" strike="noStrike" cap="none" normalizeH="0" baseline="0">
+                <a:ln>
+                  <a:noFill/>
+                </a:ln>
+                <a:solidFill>
+                  <a:schemeClr val="tx1"/>
+                </a:solidFill>
+                <a:effectLst/>
+                <a:latin typeface="Arial" panose="020B0604020202020204" pitchFamily="34" charset="0"/>
+              </a:rPr>
+              <a:t>class -ı</a:t>
+            </a:r>
+            <a:r>
+              <a:rPr kumimoji="0" lang="en-US" altLang="en-US" sz="1300" b="0" i="0" u="none" strike="noStrike" cap="none" normalizeH="0" baseline="0">
+                <a:ln>
+                  <a:noFill/>
+                </a:ln>
+                <a:solidFill>
+                  <a:schemeClr val="tx1"/>
+                </a:solidFill>
+                <a:effectLst/>
+                <a:latin typeface="Arial" panose="020B0604020202020204" pitchFamily="34" charset="0"/>
+              </a:rPr>
+              <a:t> yaradır.</a:t>
+            </a:r>
+          </a:p>
+          <a:p>
+            <a:pPr>
+              <a:lnSpc>
+                <a:spcPct val="150000"/>
+              </a:lnSpc>
+              <a:buNone/>
+            </a:pPr>
+            <a:endParaRPr kumimoji="0" lang="en-US" altLang="en-US" sz="1300" b="0" i="0" u="none" strike="noStrike" cap="none" normalizeH="0" baseline="0">
+              <a:ln>
+                <a:noFill/>
+              </a:ln>
+              <a:solidFill>
+                <a:schemeClr val="tx1"/>
+              </a:solidFill>
+              <a:effectLst/>
+              <a:latin typeface="Arial" panose="020B0604020202020204" pitchFamily="34" charset="0"/>
+            </a:endParaRPr>
+          </a:p>
+          <a:p>
+            <a:pPr>
+              <a:lnSpc>
+                <a:spcPct val="150000"/>
+              </a:lnSpc>
+              <a:buNone/>
+            </a:pPr>
+            <a:r>
+              <a:rPr kumimoji="0" lang="en-US" altLang="en-US" sz="1300" b="0" i="0" u="none" strike="noStrike" cap="none" normalizeH="0" baseline="0">
+                <a:ln>
+                  <a:noFill/>
+                </a:ln>
+                <a:solidFill>
+                  <a:schemeClr val="tx1"/>
+                </a:solidFill>
+                <a:effectLst/>
+                <a:latin typeface="Arial" panose="020B0604020202020204" pitchFamily="34" charset="0"/>
+              </a:rPr>
+              <a:t>Bu klasın içində </a:t>
+            </a:r>
+            <a:r>
+              <a:rPr kumimoji="0" lang="en-US" altLang="en-US" sz="1300" b="1" i="0" u="none" strike="noStrike" cap="none" normalizeH="0" baseline="0">
+                <a:ln>
+                  <a:noFill/>
+                </a:ln>
+                <a:solidFill>
+                  <a:schemeClr val="tx1"/>
+                </a:solidFill>
+                <a:effectLst/>
+                <a:latin typeface="Arial" panose="020B0604020202020204" pitchFamily="34" charset="0"/>
+              </a:rPr>
+              <a:t>run() </a:t>
+            </a:r>
+            <a:r>
+              <a:rPr kumimoji="0" lang="en-US" altLang="en-US" sz="1300" b="0" i="0" u="none" strike="noStrike" cap="none" normalizeH="0" baseline="0">
+                <a:ln>
+                  <a:noFill/>
+                </a:ln>
+                <a:solidFill>
+                  <a:schemeClr val="tx1"/>
+                </a:solidFill>
+                <a:effectLst/>
+                <a:latin typeface="Arial" panose="020B0604020202020204" pitchFamily="34" charset="0"/>
+              </a:rPr>
+              <a:t>adlı metod olur — məlumatlar bu metodun içində daxil edilir.</a:t>
+            </a:r>
+          </a:p>
+        </p:txBody>
+      </p:sp>
+      <p:pic>
+        <p:nvPicPr>
+          <p:cNvPr id="4" name="Picture 3">
+            <a:extLst>
+              <a:ext uri="{FF2B5EF4-FFF2-40B4-BE49-F238E27FC236}">
+                <a16:creationId xmlns:a16="http://schemas.microsoft.com/office/drawing/2014/main" id="{C75C2873-151E-C0FD-0F0B-73B998CDD0BE}"/>
+              </a:ext>
+            </a:extLst>
+          </p:cNvPr>
+          <p:cNvPicPr>
+            <a:picLocks noChangeAspect="1"/>
+          </p:cNvPicPr>
+          <p:nvPr/>
+        </p:nvPicPr>
+        <p:blipFill>
+          <a:blip r:embed="rId2"/>
+          <a:stretch>
+            <a:fillRect/>
+          </a:stretch>
+        </p:blipFill>
+        <p:spPr>
+          <a:xfrm>
+            <a:off x="8429100" y="2933152"/>
+            <a:ext cx="3762900" cy="3924848"/>
+          </a:xfrm>
+          <a:prstGeom prst="rect">
+            <a:avLst/>
+          </a:prstGeom>
+        </p:spPr>
+      </p:pic>
+      <p:pic>
+        <p:nvPicPr>
+          <p:cNvPr id="6" name="Picture 5">
+            <a:extLst>
+              <a:ext uri="{FF2B5EF4-FFF2-40B4-BE49-F238E27FC236}">
+                <a16:creationId xmlns:a16="http://schemas.microsoft.com/office/drawing/2014/main" id="{C6B69BEC-D112-9AC6-53C4-F5CD71367123}"/>
+              </a:ext>
+            </a:extLst>
+          </p:cNvPr>
+          <p:cNvPicPr>
+            <a:picLocks noChangeAspect="1"/>
+          </p:cNvPicPr>
+          <p:nvPr/>
+        </p:nvPicPr>
+        <p:blipFill>
+          <a:blip r:embed="rId3"/>
+          <a:stretch>
+            <a:fillRect/>
+          </a:stretch>
+        </p:blipFill>
+        <p:spPr>
+          <a:xfrm>
+            <a:off x="0" y="4103441"/>
+            <a:ext cx="5769205" cy="2754559"/>
+          </a:xfrm>
+          <a:prstGeom prst="rect">
+            <a:avLst/>
+          </a:prstGeom>
+          <a:ln w="38100" cap="sq">
+            <a:solidFill>
+              <a:srgbClr val="000000"/>
+            </a:solidFill>
+            <a:prstDash val="solid"/>
+            <a:miter lim="800000"/>
+          </a:ln>
+          <a:effectLst>
+            <a:outerShdw blurRad="50800" dist="38100" dir="2700000" algn="tl" rotWithShape="0">
+              <a:srgbClr val="000000">
+                <a:alpha val="43000"/>
+              </a:srgbClr>
+            </a:outerShdw>
+          </a:effectLst>
+        </p:spPr>
+      </p:pic>
+    </p:spTree>
+    <p:extLst>
+      <p:ext uri="{BB962C8B-B14F-4D97-AF65-F5344CB8AC3E}">
+        <p14:creationId xmlns:p14="http://schemas.microsoft.com/office/powerpoint/2010/main" val="1359385102"/>
+      </p:ext>
+    </p:extLst>
+  </p:cSld>
+  <p:clrMapOvr>
+    <a:masterClrMapping/>
+  </p:clrMapOvr>
+</p:sld>
+</file>
+
+<file path=ppt/slides/slide10.xml><?xml version="1.0" encoding="utf-8"?>
+<p:sld xmlns:a="http://schemas.openxmlformats.org/drawingml/2006/main" xmlns:r="http://schemas.openxmlformats.org/officeDocument/2006/relationships" xmlns:p="http://schemas.openxmlformats.org/presentationml/2006/main">
+  <p:cSld>
+    <p:spTree>
+      <p:nvGrpSpPr>
+        <p:cNvPr id="1" name="">
+          <a:extLst>
+            <a:ext uri="{FF2B5EF4-FFF2-40B4-BE49-F238E27FC236}">
+              <a16:creationId xmlns:a16="http://schemas.microsoft.com/office/drawing/2014/main" id="{63EC2D4B-8EEF-631A-D767-6BCF59CAE234}"/>
+            </a:ext>
+          </a:extLst>
+        </p:cNvPr>
+        <p:cNvGrpSpPr/>
+        <p:nvPr/>
+      </p:nvGrpSpPr>
+      <p:grpSpPr>
+        <a:xfrm>
+          <a:off x="0" y="0"/>
+          <a:ext cx="0" cy="0"/>
+          <a:chOff x="0" y="0"/>
+          <a:chExt cx="0" cy="0"/>
+        </a:xfrm>
+      </p:grpSpPr>
+      <p:sp>
+        <p:nvSpPr>
+          <p:cNvPr id="3" name="TextBox 2">
+            <a:extLst>
+              <a:ext uri="{FF2B5EF4-FFF2-40B4-BE49-F238E27FC236}">
+                <a16:creationId xmlns:a16="http://schemas.microsoft.com/office/drawing/2014/main" id="{40B9F984-7B0D-B318-D491-53427E8DC4C6}"/>
+              </a:ext>
+            </a:extLst>
+          </p:cNvPr>
+          <p:cNvSpPr txBox="1"/>
+          <p:nvPr/>
+        </p:nvSpPr>
+        <p:spPr>
+          <a:xfrm>
+            <a:off x="217714" y="255046"/>
             <a:ext cx="11756571" cy="355354"/>
           </a:xfrm>
           <a:prstGeom prst="rect">
@@ -3386,7 +3964,93 @@
     </p:spTree>
     <p:extLst>
       <p:ext uri="{BB962C8B-B14F-4D97-AF65-F5344CB8AC3E}">
-        <p14:creationId xmlns:p14="http://schemas.microsoft.com/office/powerpoint/2010/main" val="1359385102"/>
+        <p14:creationId xmlns:p14="http://schemas.microsoft.com/office/powerpoint/2010/main" val="3160538269"/>
+      </p:ext>
+    </p:extLst>
+  </p:cSld>
+  <p:clrMapOvr>
+    <a:masterClrMapping/>
+  </p:clrMapOvr>
+</p:sld>
+</file>
+
+<file path=ppt/slides/slide11.xml><?xml version="1.0" encoding="utf-8"?>
+<p:sld xmlns:a="http://schemas.openxmlformats.org/drawingml/2006/main" xmlns:r="http://schemas.openxmlformats.org/officeDocument/2006/relationships" xmlns:p="http://schemas.openxmlformats.org/presentationml/2006/main">
+  <p:cSld>
+    <p:spTree>
+      <p:nvGrpSpPr>
+        <p:cNvPr id="1" name="">
+          <a:extLst>
+            <a:ext uri="{FF2B5EF4-FFF2-40B4-BE49-F238E27FC236}">
+              <a16:creationId xmlns:a16="http://schemas.microsoft.com/office/drawing/2014/main" id="{BE2964F7-EA23-73DA-8A7C-816F76332FBA}"/>
+            </a:ext>
+          </a:extLst>
+        </p:cNvPr>
+        <p:cNvGrpSpPr/>
+        <p:nvPr/>
+      </p:nvGrpSpPr>
+      <p:grpSpPr>
+        <a:xfrm>
+          <a:off x="0" y="0"/>
+          <a:ext cx="0" cy="0"/>
+          <a:chOff x="0" y="0"/>
+          <a:chExt cx="0" cy="0"/>
+        </a:xfrm>
+      </p:grpSpPr>
+      <p:sp>
+        <p:nvSpPr>
+          <p:cNvPr id="3" name="TextBox 2">
+            <a:extLst>
+              <a:ext uri="{FF2B5EF4-FFF2-40B4-BE49-F238E27FC236}">
+                <a16:creationId xmlns:a16="http://schemas.microsoft.com/office/drawing/2014/main" id="{94CA7310-62DE-13DC-85B8-0BB949DB08BF}"/>
+              </a:ext>
+            </a:extLst>
+          </p:cNvPr>
+          <p:cNvSpPr txBox="1"/>
+          <p:nvPr/>
+        </p:nvSpPr>
+        <p:spPr>
+          <a:xfrm>
+            <a:off x="217714" y="255046"/>
+            <a:ext cx="11756571" cy="355354"/>
+          </a:xfrm>
+          <a:prstGeom prst="rect">
+            <a:avLst/>
+          </a:prstGeom>
+          <a:noFill/>
+        </p:spPr>
+        <p:txBody>
+          <a:bodyPr wrap="square">
+            <a:spAutoFit/>
+          </a:bodyPr>
+          <a:lstStyle/>
+          <a:p>
+            <a:pPr>
+              <a:lnSpc>
+                <a:spcPct val="150000"/>
+              </a:lnSpc>
+              <a:buNone/>
+            </a:pPr>
+            <a:r>
+              <a:rPr kumimoji="0" lang="en-US" altLang="en-US" sz="1300" b="0" i="0" u="none" strike="noStrike" cap="none" normalizeH="0" baseline="0">
+                <a:ln>
+                  <a:noFill/>
+                </a:ln>
+                <a:solidFill>
+                  <a:schemeClr val="tx1"/>
+                </a:solidFill>
+                <a:effectLst/>
+                <a:latin typeface="Arial" panose="020B0604020202020204" pitchFamily="34" charset="0"/>
+              </a:rPr>
+              <a:t>.</a:t>
+            </a:r>
+          </a:p>
+        </p:txBody>
+      </p:sp>
+    </p:spTree>
+    <p:extLst>
+      <p:ext uri="{BB962C8B-B14F-4D97-AF65-F5344CB8AC3E}">
+        <p14:creationId xmlns:p14="http://schemas.microsoft.com/office/powerpoint/2010/main" val="3356102584"/>
       </p:ext>
     </p:extLst>
   </p:cSld>
@@ -3434,6 +4098,1096 @@
         <p:spPr>
           <a:xfrm>
             <a:off x="217714" y="255046"/>
+            <a:ext cx="11756571" cy="1555682"/>
+          </a:xfrm>
+          <a:prstGeom prst="rect">
+            <a:avLst/>
+          </a:prstGeom>
+          <a:noFill/>
+        </p:spPr>
+        <p:txBody>
+          <a:bodyPr wrap="square">
+            <a:spAutoFit/>
+          </a:bodyPr>
+          <a:lstStyle/>
+          <a:p>
+            <a:pPr>
+              <a:lnSpc>
+                <a:spcPct val="150000"/>
+              </a:lnSpc>
+              <a:buNone/>
+            </a:pPr>
+            <a:r>
+              <a:rPr kumimoji="0" lang="en-US" altLang="en-US" sz="1300" b="0" i="0" u="none" strike="noStrike" cap="none" normalizeH="0" baseline="0">
+                <a:ln>
+                  <a:noFill/>
+                </a:ln>
+                <a:solidFill>
+                  <a:schemeClr val="tx1"/>
+                </a:solidFill>
+                <a:effectLst/>
+                <a:latin typeface="Arial" panose="020B0604020202020204" pitchFamily="34" charset="0"/>
+              </a:rPr>
+              <a:t>Nə qədər məlumat daxil edir?</a:t>
+            </a:r>
+            <a:endParaRPr kumimoji="0" lang="az-Latn-AZ" altLang="en-US" sz="1300" b="0" i="0" u="none" strike="noStrike" cap="none" normalizeH="0" baseline="0">
+              <a:ln>
+                <a:noFill/>
+              </a:ln>
+              <a:solidFill>
+                <a:schemeClr val="tx1"/>
+              </a:solidFill>
+              <a:effectLst/>
+              <a:latin typeface="Arial" panose="020B0604020202020204" pitchFamily="34" charset="0"/>
+            </a:endParaRPr>
+          </a:p>
+          <a:p>
+            <a:pPr>
+              <a:lnSpc>
+                <a:spcPct val="150000"/>
+              </a:lnSpc>
+              <a:buNone/>
+            </a:pPr>
+            <a:endParaRPr kumimoji="0" lang="en-US" altLang="en-US" sz="1300" b="0" i="0" u="none" strike="noStrike" cap="none" normalizeH="0" baseline="0">
+              <a:ln>
+                <a:noFill/>
+              </a:ln>
+              <a:solidFill>
+                <a:schemeClr val="tx1"/>
+              </a:solidFill>
+              <a:effectLst/>
+              <a:latin typeface="Arial" panose="020B0604020202020204" pitchFamily="34" charset="0"/>
+            </a:endParaRPr>
+          </a:p>
+          <a:p>
+            <a:pPr>
+              <a:lnSpc>
+                <a:spcPct val="150000"/>
+              </a:lnSpc>
+              <a:buNone/>
+            </a:pPr>
+            <a:r>
+              <a:rPr kumimoji="0" lang="en-US" altLang="en-US" sz="1300" b="0" i="0" u="none" strike="noStrike" cap="none" normalizeH="0" baseline="0">
+                <a:ln>
+                  <a:noFill/>
+                </a:ln>
+                <a:solidFill>
+                  <a:schemeClr val="tx1"/>
+                </a:solidFill>
+                <a:effectLst/>
+                <a:latin typeface="Arial" panose="020B0604020202020204" pitchFamily="34" charset="0"/>
+              </a:rPr>
+              <a:t>Bu </a:t>
+            </a:r>
+            <a:r>
+              <a:rPr kumimoji="0" lang="en-US" altLang="en-US" sz="1300" b="1" i="0" u="none" strike="noStrike" cap="none" normalizeH="0" baseline="0">
+                <a:ln>
+                  <a:noFill/>
+                </a:ln>
+                <a:solidFill>
+                  <a:schemeClr val="tx1"/>
+                </a:solidFill>
+                <a:effectLst/>
+                <a:latin typeface="Arial" panose="020B0604020202020204" pitchFamily="34" charset="0"/>
+              </a:rPr>
+              <a:t>seeder</a:t>
+            </a:r>
+            <a:r>
+              <a:rPr kumimoji="0" lang="en-US" altLang="en-US" sz="1300" b="0" i="0" u="none" strike="noStrike" cap="none" normalizeH="0" baseline="0">
+                <a:ln>
+                  <a:noFill/>
+                </a:ln>
+                <a:solidFill>
+                  <a:schemeClr val="tx1"/>
+                </a:solidFill>
+                <a:effectLst/>
+                <a:latin typeface="Arial" panose="020B0604020202020204" pitchFamily="34" charset="0"/>
+              </a:rPr>
+              <a:t> sadəcə </a:t>
+            </a:r>
+            <a:r>
+              <a:rPr kumimoji="0" lang="en-US" altLang="en-US" sz="1300" b="1" i="0" u="none" strike="noStrike" cap="none" normalizeH="0" baseline="0">
+                <a:ln>
+                  <a:noFill/>
+                </a:ln>
+                <a:solidFill>
+                  <a:srgbClr val="FF0000"/>
+                </a:solidFill>
+                <a:effectLst/>
+                <a:latin typeface="Arial" panose="020B0604020202020204" pitchFamily="34" charset="0"/>
+              </a:rPr>
+              <a:t>1</a:t>
+            </a:r>
+            <a:r>
+              <a:rPr kumimoji="0" lang="en-US" altLang="en-US" sz="1300" b="0" i="0" u="none" strike="noStrike" cap="none" normalizeH="0" baseline="0">
+                <a:ln>
+                  <a:noFill/>
+                </a:ln>
+                <a:solidFill>
+                  <a:schemeClr val="tx1"/>
+                </a:solidFill>
+                <a:effectLst/>
+                <a:latin typeface="Arial" panose="020B0604020202020204" pitchFamily="34" charset="0"/>
+              </a:rPr>
+              <a:t> ədəd post daxil edir.</a:t>
+            </a:r>
+          </a:p>
+          <a:p>
+            <a:pPr>
+              <a:lnSpc>
+                <a:spcPct val="150000"/>
+              </a:lnSpc>
+              <a:buNone/>
+            </a:pPr>
+            <a:endParaRPr kumimoji="0" lang="en-US" altLang="en-US" sz="1300" b="0" i="0" u="none" strike="noStrike" cap="none" normalizeH="0" baseline="0">
+              <a:ln>
+                <a:noFill/>
+              </a:ln>
+              <a:solidFill>
+                <a:schemeClr val="tx1"/>
+              </a:solidFill>
+              <a:effectLst/>
+              <a:latin typeface="Arial" panose="020B0604020202020204" pitchFamily="34" charset="0"/>
+            </a:endParaRPr>
+          </a:p>
+          <a:p>
+            <a:pPr>
+              <a:lnSpc>
+                <a:spcPct val="150000"/>
+              </a:lnSpc>
+              <a:buNone/>
+            </a:pPr>
+            <a:r>
+              <a:rPr kumimoji="0" lang="en-US" altLang="en-US" sz="1300" b="0" i="0" u="none" strike="noStrike" cap="none" normalizeH="0" baseline="0">
+                <a:ln>
+                  <a:noFill/>
+                </a:ln>
+                <a:solidFill>
+                  <a:schemeClr val="tx1"/>
+                </a:solidFill>
+                <a:effectLst/>
+                <a:latin typeface="Arial" panose="020B0604020202020204" pitchFamily="34" charset="0"/>
+              </a:rPr>
+              <a:t>Əgər </a:t>
+            </a:r>
+            <a:r>
+              <a:rPr kumimoji="0" lang="en-US" altLang="en-US" sz="1300" b="1" i="0" u="none" strike="noStrike" cap="none" normalizeH="0" baseline="0">
+                <a:ln>
+                  <a:noFill/>
+                </a:ln>
+                <a:solidFill>
+                  <a:schemeClr val="tx1"/>
+                </a:solidFill>
+                <a:effectLst/>
+                <a:latin typeface="Arial" panose="020B0604020202020204" pitchFamily="34" charset="0"/>
+              </a:rPr>
+              <a:t>çox post </a:t>
+            </a:r>
+            <a:r>
+              <a:rPr kumimoji="0" lang="en-US" altLang="en-US" sz="1300" b="0" i="0" u="none" strike="noStrike" cap="none" normalizeH="0" baseline="0">
+                <a:ln>
+                  <a:noFill/>
+                </a:ln>
+                <a:solidFill>
+                  <a:schemeClr val="tx1"/>
+                </a:solidFill>
+                <a:effectLst/>
+                <a:latin typeface="Arial" panose="020B0604020202020204" pitchFamily="34" charset="0"/>
+              </a:rPr>
+              <a:t>daxil etmək istəyirsinizsə, </a:t>
+            </a:r>
+            <a:r>
+              <a:rPr kumimoji="0" lang="en-US" altLang="en-US" sz="1300" b="1" i="0" u="none" strike="noStrike" cap="none" normalizeH="0" baseline="0">
+                <a:ln>
+                  <a:noFill/>
+                </a:ln>
+                <a:solidFill>
+                  <a:srgbClr val="00B050"/>
+                </a:solidFill>
+                <a:effectLst/>
+                <a:latin typeface="Arial" panose="020B0604020202020204" pitchFamily="34" charset="0"/>
+              </a:rPr>
+              <a:t>for</a:t>
+            </a:r>
+            <a:r>
+              <a:rPr kumimoji="0" lang="en-US" altLang="en-US" sz="1300" b="0" i="0" u="none" strike="noStrike" cap="none" normalizeH="0" baseline="0">
+                <a:ln>
+                  <a:noFill/>
+                </a:ln>
+                <a:solidFill>
+                  <a:schemeClr val="tx1"/>
+                </a:solidFill>
+                <a:effectLst/>
+                <a:latin typeface="Arial" panose="020B0604020202020204" pitchFamily="34" charset="0"/>
+              </a:rPr>
+              <a:t>-dövrü ilə çoxalda bilərsiniz:</a:t>
+            </a:r>
+          </a:p>
+        </p:txBody>
+      </p:sp>
+      <p:pic>
+        <p:nvPicPr>
+          <p:cNvPr id="4" name="Picture 3">
+            <a:extLst>
+              <a:ext uri="{FF2B5EF4-FFF2-40B4-BE49-F238E27FC236}">
+                <a16:creationId xmlns:a16="http://schemas.microsoft.com/office/drawing/2014/main" id="{C493477D-F793-76E1-25ED-9EF8FB563ABE}"/>
+              </a:ext>
+            </a:extLst>
+          </p:cNvPr>
+          <p:cNvPicPr>
+            <a:picLocks noChangeAspect="1"/>
+          </p:cNvPicPr>
+          <p:nvPr/>
+        </p:nvPicPr>
+        <p:blipFill>
+          <a:blip r:embed="rId2"/>
+          <a:stretch>
+            <a:fillRect/>
+          </a:stretch>
+        </p:blipFill>
+        <p:spPr>
+          <a:xfrm>
+            <a:off x="6809624" y="3418995"/>
+            <a:ext cx="5382376" cy="3439005"/>
+          </a:xfrm>
+          <a:prstGeom prst="rect">
+            <a:avLst/>
+          </a:prstGeom>
+        </p:spPr>
+      </p:pic>
+    </p:spTree>
+    <p:extLst>
+      <p:ext uri="{BB962C8B-B14F-4D97-AF65-F5344CB8AC3E}">
+        <p14:creationId xmlns:p14="http://schemas.microsoft.com/office/powerpoint/2010/main" val="1186759978"/>
+      </p:ext>
+    </p:extLst>
+  </p:cSld>
+  <p:clrMapOvr>
+    <a:masterClrMapping/>
+  </p:clrMapOvr>
+</p:sld>
+</file>
+
+<file path=ppt/slides/slide3.xml><?xml version="1.0" encoding="utf-8"?>
+<p:sld xmlns:a="http://schemas.openxmlformats.org/drawingml/2006/main" xmlns:r="http://schemas.openxmlformats.org/officeDocument/2006/relationships" xmlns:p="http://schemas.openxmlformats.org/presentationml/2006/main">
+  <p:cSld>
+    <p:spTree>
+      <p:nvGrpSpPr>
+        <p:cNvPr id="1" name="">
+          <a:extLst>
+            <a:ext uri="{FF2B5EF4-FFF2-40B4-BE49-F238E27FC236}">
+              <a16:creationId xmlns:a16="http://schemas.microsoft.com/office/drawing/2014/main" id="{1F6395CC-C9EA-6EF5-804B-05E5A1E88B80}"/>
+            </a:ext>
+          </a:extLst>
+        </p:cNvPr>
+        <p:cNvGrpSpPr/>
+        <p:nvPr/>
+      </p:nvGrpSpPr>
+      <p:grpSpPr>
+        <a:xfrm>
+          <a:off x="0" y="0"/>
+          <a:ext cx="0" cy="0"/>
+          <a:chOff x="0" y="0"/>
+          <a:chExt cx="0" cy="0"/>
+        </a:xfrm>
+      </p:grpSpPr>
+      <p:sp>
+        <p:nvSpPr>
+          <p:cNvPr id="3" name="TextBox 2">
+            <a:extLst>
+              <a:ext uri="{FF2B5EF4-FFF2-40B4-BE49-F238E27FC236}">
+                <a16:creationId xmlns:a16="http://schemas.microsoft.com/office/drawing/2014/main" id="{F425DCAE-04EE-4623-137E-E0B10738CF24}"/>
+              </a:ext>
+            </a:extLst>
+          </p:cNvPr>
+          <p:cNvSpPr txBox="1"/>
+          <p:nvPr/>
+        </p:nvSpPr>
+        <p:spPr>
+          <a:xfrm>
+            <a:off x="217714" y="255046"/>
+            <a:ext cx="11688339" cy="3356175"/>
+          </a:xfrm>
+          <a:prstGeom prst="rect">
+            <a:avLst/>
+          </a:prstGeom>
+          <a:noFill/>
+        </p:spPr>
+        <p:txBody>
+          <a:bodyPr wrap="square">
+            <a:spAutoFit/>
+          </a:bodyPr>
+          <a:lstStyle/>
+          <a:p>
+            <a:pPr>
+              <a:lnSpc>
+                <a:spcPct val="150000"/>
+              </a:lnSpc>
+              <a:buNone/>
+            </a:pPr>
+            <a:r>
+              <a:rPr kumimoji="0" lang="en-US" altLang="en-US" sz="1300" b="0" i="0" u="none" strike="noStrike" cap="none" normalizeH="0" baseline="0">
+                <a:ln>
+                  <a:noFill/>
+                </a:ln>
+                <a:solidFill>
+                  <a:schemeClr val="tx1"/>
+                </a:solidFill>
+                <a:effectLst/>
+                <a:latin typeface="Arial" panose="020B0604020202020204" pitchFamily="34" charset="0"/>
+              </a:rPr>
+              <a:t>3️⃣ </a:t>
+            </a:r>
+            <a:r>
+              <a:rPr kumimoji="0" lang="en-US" altLang="en-US" sz="1300" b="1" i="0" u="none" strike="noStrike" cap="none" normalizeH="0" baseline="0">
+                <a:ln>
+                  <a:noFill/>
+                </a:ln>
+                <a:solidFill>
+                  <a:srgbClr val="FF0000"/>
+                </a:solidFill>
+                <a:effectLst/>
+                <a:latin typeface="Arial" panose="020B0604020202020204" pitchFamily="34" charset="0"/>
+              </a:rPr>
+              <a:t>DatabaseSeeder.php </a:t>
+            </a:r>
+            <a:r>
+              <a:rPr kumimoji="0" lang="en-US" altLang="en-US" sz="1300" b="0" i="0" u="none" strike="noStrike" cap="none" normalizeH="0" baseline="0">
+                <a:ln>
+                  <a:noFill/>
+                </a:ln>
+                <a:solidFill>
+                  <a:schemeClr val="tx1"/>
+                </a:solidFill>
+                <a:effectLst/>
+                <a:latin typeface="Arial" panose="020B0604020202020204" pitchFamily="34" charset="0"/>
+              </a:rPr>
+              <a:t>– Seeder-lərin idarəedici faylı</a:t>
+            </a:r>
+            <a:endParaRPr kumimoji="0" lang="az-Latn-AZ" altLang="en-US" sz="1300" b="0" i="0" u="none" strike="noStrike" cap="none" normalizeH="0" baseline="0">
+              <a:ln>
+                <a:noFill/>
+              </a:ln>
+              <a:solidFill>
+                <a:schemeClr val="tx1"/>
+              </a:solidFill>
+              <a:effectLst/>
+              <a:latin typeface="Arial" panose="020B0604020202020204" pitchFamily="34" charset="0"/>
+            </a:endParaRPr>
+          </a:p>
+          <a:p>
+            <a:pPr>
+              <a:lnSpc>
+                <a:spcPct val="150000"/>
+              </a:lnSpc>
+              <a:buNone/>
+            </a:pPr>
+            <a:endParaRPr kumimoji="0" lang="en-US" altLang="en-US" sz="1300" b="0" i="0" u="none" strike="noStrike" cap="none" normalizeH="0" baseline="0">
+              <a:ln>
+                <a:noFill/>
+              </a:ln>
+              <a:solidFill>
+                <a:schemeClr val="tx1"/>
+              </a:solidFill>
+              <a:effectLst/>
+              <a:latin typeface="Arial" panose="020B0604020202020204" pitchFamily="34" charset="0"/>
+            </a:endParaRPr>
+          </a:p>
+          <a:p>
+            <a:pPr>
+              <a:lnSpc>
+                <a:spcPct val="150000"/>
+              </a:lnSpc>
+              <a:buNone/>
+            </a:pPr>
+            <a:r>
+              <a:rPr kumimoji="0" lang="en-US" altLang="en-US" sz="1300" b="0" i="0" u="none" strike="noStrike" cap="none" normalizeH="0" baseline="0">
+                <a:ln>
+                  <a:noFill/>
+                </a:ln>
+                <a:solidFill>
+                  <a:schemeClr val="tx1"/>
+                </a:solidFill>
+                <a:effectLst/>
+                <a:latin typeface="Arial" panose="020B0604020202020204" pitchFamily="34" charset="0"/>
+              </a:rPr>
+              <a:t>Laravel avtomatik olaraq </a:t>
+            </a:r>
+            <a:r>
+              <a:rPr kumimoji="0" lang="en-US" altLang="en-US" sz="1300" b="1" i="0" u="none" strike="noStrike" cap="none" normalizeH="0" baseline="0">
+                <a:ln>
+                  <a:noFill/>
+                </a:ln>
+                <a:solidFill>
+                  <a:schemeClr val="tx1"/>
+                </a:solidFill>
+                <a:effectLst/>
+                <a:latin typeface="Arial" panose="020B0604020202020204" pitchFamily="34" charset="0"/>
+              </a:rPr>
+              <a:t>DatabaseSeeder.php </a:t>
+            </a:r>
+            <a:r>
+              <a:rPr kumimoji="0" lang="en-US" altLang="en-US" sz="1300" b="0" i="0" u="none" strike="noStrike" cap="none" normalizeH="0" baseline="0">
+                <a:ln>
+                  <a:noFill/>
+                </a:ln>
+                <a:solidFill>
+                  <a:schemeClr val="tx1"/>
+                </a:solidFill>
+                <a:effectLst/>
+                <a:latin typeface="Arial" panose="020B0604020202020204" pitchFamily="34" charset="0"/>
+              </a:rPr>
+              <a:t>faylını tanıyır. Bütün seeder-ləri bu faylın içində çağırmalısınız.</a:t>
+            </a:r>
+          </a:p>
+          <a:p>
+            <a:pPr>
+              <a:lnSpc>
+                <a:spcPct val="150000"/>
+              </a:lnSpc>
+              <a:buNone/>
+            </a:pPr>
+            <a:endParaRPr kumimoji="0" lang="en-US" altLang="en-US" sz="1300" b="0" i="0" u="none" strike="noStrike" cap="none" normalizeH="0" baseline="0">
+              <a:ln>
+                <a:noFill/>
+              </a:ln>
+              <a:solidFill>
+                <a:schemeClr val="tx1"/>
+              </a:solidFill>
+              <a:effectLst/>
+              <a:latin typeface="Arial" panose="020B0604020202020204" pitchFamily="34" charset="0"/>
+            </a:endParaRPr>
+          </a:p>
+          <a:p>
+            <a:pPr>
+              <a:lnSpc>
+                <a:spcPct val="150000"/>
+              </a:lnSpc>
+              <a:buNone/>
+            </a:pPr>
+            <a:r>
+              <a:rPr kumimoji="0" lang="en-US" altLang="en-US" sz="1300" b="0" i="0" u="none" strike="noStrike" cap="none" normalizeH="0" baseline="0">
+                <a:ln>
+                  <a:noFill/>
+                </a:ln>
+                <a:solidFill>
+                  <a:schemeClr val="tx1"/>
+                </a:solidFill>
+                <a:effectLst/>
+                <a:latin typeface="Arial" panose="020B0604020202020204" pitchFamily="34" charset="0"/>
+              </a:rPr>
+              <a:t>Bu nə edir?</a:t>
+            </a:r>
+            <a:endParaRPr kumimoji="0" lang="az-Latn-AZ" altLang="en-US" sz="1300" b="0" i="0" u="none" strike="noStrike" cap="none" normalizeH="0" baseline="0">
+              <a:ln>
+                <a:noFill/>
+              </a:ln>
+              <a:solidFill>
+                <a:schemeClr val="tx1"/>
+              </a:solidFill>
+              <a:effectLst/>
+              <a:latin typeface="Arial" panose="020B0604020202020204" pitchFamily="34" charset="0"/>
+            </a:endParaRPr>
+          </a:p>
+          <a:p>
+            <a:pPr>
+              <a:lnSpc>
+                <a:spcPct val="150000"/>
+              </a:lnSpc>
+              <a:buNone/>
+            </a:pPr>
+            <a:endParaRPr kumimoji="0" lang="en-US" altLang="en-US" sz="1300" b="0" i="0" u="none" strike="noStrike" cap="none" normalizeH="0" baseline="0">
+              <a:ln>
+                <a:noFill/>
+              </a:ln>
+              <a:solidFill>
+                <a:schemeClr val="tx1"/>
+              </a:solidFill>
+              <a:effectLst/>
+              <a:latin typeface="Arial" panose="020B0604020202020204" pitchFamily="34" charset="0"/>
+            </a:endParaRPr>
+          </a:p>
+          <a:p>
+            <a:pPr marL="285750" indent="-285750">
+              <a:lnSpc>
+                <a:spcPct val="150000"/>
+              </a:lnSpc>
+              <a:buFont typeface="Wingdings" panose="05000000000000000000" pitchFamily="2" charset="2"/>
+              <a:buChar char="q"/>
+            </a:pPr>
+            <a:r>
+              <a:rPr kumimoji="0" lang="en-US" altLang="en-US" sz="1300" b="0" i="0" u="none" strike="noStrike" cap="none" normalizeH="0" baseline="0">
+                <a:ln>
+                  <a:noFill/>
+                </a:ln>
+                <a:solidFill>
+                  <a:schemeClr val="tx1"/>
+                </a:solidFill>
+                <a:effectLst/>
+                <a:latin typeface="Arial" panose="020B0604020202020204" pitchFamily="34" charset="0"/>
+              </a:rPr>
+              <a:t>PostSeeder::class daxilindəki </a:t>
+            </a:r>
+            <a:r>
+              <a:rPr kumimoji="0" lang="en-US" altLang="en-US" sz="1300" b="1" i="0" u="none" strike="noStrike" cap="none" normalizeH="0" baseline="0">
+                <a:ln>
+                  <a:noFill/>
+                </a:ln>
+                <a:solidFill>
+                  <a:schemeClr val="tx1"/>
+                </a:solidFill>
+                <a:effectLst/>
+                <a:latin typeface="Arial" panose="020B0604020202020204" pitchFamily="34" charset="0"/>
+              </a:rPr>
+              <a:t>run() </a:t>
+            </a:r>
+            <a:r>
+              <a:rPr kumimoji="0" lang="en-US" altLang="en-US" sz="1300" b="0" i="0" u="none" strike="noStrike" cap="none" normalizeH="0" baseline="0">
+                <a:ln>
+                  <a:noFill/>
+                </a:ln>
+                <a:solidFill>
+                  <a:schemeClr val="tx1"/>
+                </a:solidFill>
+                <a:effectLst/>
+                <a:latin typeface="Arial" panose="020B0604020202020204" pitchFamily="34" charset="0"/>
+              </a:rPr>
+              <a:t>metodunu işə salır.</a:t>
+            </a:r>
+          </a:p>
+          <a:p>
+            <a:pPr marL="285750" indent="-285750">
+              <a:lnSpc>
+                <a:spcPct val="150000"/>
+              </a:lnSpc>
+              <a:buFont typeface="Wingdings" panose="05000000000000000000" pitchFamily="2" charset="2"/>
+              <a:buChar char="q"/>
+            </a:pPr>
+            <a:endParaRPr kumimoji="0" lang="en-US" altLang="en-US" sz="1300" b="0" i="0" u="none" strike="noStrike" cap="none" normalizeH="0" baseline="0">
+              <a:ln>
+                <a:noFill/>
+              </a:ln>
+              <a:solidFill>
+                <a:schemeClr val="tx1"/>
+              </a:solidFill>
+              <a:effectLst/>
+              <a:latin typeface="Arial" panose="020B0604020202020204" pitchFamily="34" charset="0"/>
+            </a:endParaRPr>
+          </a:p>
+          <a:p>
+            <a:pPr marL="285750" indent="-285750">
+              <a:lnSpc>
+                <a:spcPct val="150000"/>
+              </a:lnSpc>
+              <a:buFont typeface="Wingdings" panose="05000000000000000000" pitchFamily="2" charset="2"/>
+              <a:buChar char="q"/>
+            </a:pPr>
+            <a:r>
+              <a:rPr kumimoji="0" lang="en-US" altLang="en-US" sz="1300" b="0" i="0" u="none" strike="noStrike" cap="none" normalizeH="0" baseline="0">
+                <a:ln>
+                  <a:noFill/>
+                </a:ln>
+                <a:solidFill>
+                  <a:schemeClr val="tx1"/>
+                </a:solidFill>
+                <a:effectLst/>
+                <a:latin typeface="Arial" panose="020B0604020202020204" pitchFamily="34" charset="0"/>
+              </a:rPr>
+              <a:t>Beləliklə, posts cədvəlinə məlumatlar daxil olur.</a:t>
+            </a:r>
+          </a:p>
+          <a:p>
+            <a:pPr marL="285750" indent="-285750">
+              <a:lnSpc>
+                <a:spcPct val="150000"/>
+              </a:lnSpc>
+              <a:buFont typeface="Wingdings" panose="05000000000000000000" pitchFamily="2" charset="2"/>
+              <a:buChar char="q"/>
+            </a:pPr>
+            <a:endParaRPr kumimoji="0" lang="en-US" altLang="en-US" sz="1300" b="0" i="0" u="none" strike="noStrike" cap="none" normalizeH="0" baseline="0">
+              <a:ln>
+                <a:noFill/>
+              </a:ln>
+              <a:solidFill>
+                <a:schemeClr val="tx1"/>
+              </a:solidFill>
+              <a:effectLst/>
+              <a:latin typeface="Arial" panose="020B0604020202020204" pitchFamily="34" charset="0"/>
+            </a:endParaRPr>
+          </a:p>
+          <a:p>
+            <a:pPr marL="285750" indent="-285750">
+              <a:lnSpc>
+                <a:spcPct val="150000"/>
+              </a:lnSpc>
+              <a:buFont typeface="Wingdings" panose="05000000000000000000" pitchFamily="2" charset="2"/>
+              <a:buChar char="q"/>
+            </a:pPr>
+            <a:r>
+              <a:rPr kumimoji="0" lang="en-US" altLang="en-US" sz="1300" b="0" i="0" u="none" strike="noStrike" cap="none" normalizeH="0" baseline="0">
+                <a:ln>
+                  <a:noFill/>
+                </a:ln>
+                <a:solidFill>
+                  <a:schemeClr val="tx1"/>
+                </a:solidFill>
+                <a:effectLst/>
+                <a:latin typeface="Arial" panose="020B0604020202020204" pitchFamily="34" charset="0"/>
+              </a:rPr>
+              <a:t>Bu sistem imkan verir ki, bir neçə seeder-i bir yerdə çağırasan:</a:t>
+            </a:r>
+          </a:p>
+        </p:txBody>
+      </p:sp>
+      <p:pic>
+        <p:nvPicPr>
+          <p:cNvPr id="4" name="Picture 3">
+            <a:extLst>
+              <a:ext uri="{FF2B5EF4-FFF2-40B4-BE49-F238E27FC236}">
+                <a16:creationId xmlns:a16="http://schemas.microsoft.com/office/drawing/2014/main" id="{C52021DA-5EE1-3147-934F-2A94B68E93F3}"/>
+              </a:ext>
+            </a:extLst>
+          </p:cNvPr>
+          <p:cNvPicPr>
+            <a:picLocks noChangeAspect="1"/>
+          </p:cNvPicPr>
+          <p:nvPr/>
+        </p:nvPicPr>
+        <p:blipFill>
+          <a:blip r:embed="rId2"/>
+          <a:stretch>
+            <a:fillRect/>
+          </a:stretch>
+        </p:blipFill>
+        <p:spPr>
+          <a:xfrm>
+            <a:off x="7819415" y="4971787"/>
+            <a:ext cx="4372585" cy="1886213"/>
+          </a:xfrm>
+          <a:prstGeom prst="rect">
+            <a:avLst/>
+          </a:prstGeom>
+        </p:spPr>
+      </p:pic>
+      <p:pic>
+        <p:nvPicPr>
+          <p:cNvPr id="6" name="Picture 5">
+            <a:extLst>
+              <a:ext uri="{FF2B5EF4-FFF2-40B4-BE49-F238E27FC236}">
+                <a16:creationId xmlns:a16="http://schemas.microsoft.com/office/drawing/2014/main" id="{67ECCA50-B400-418C-0A76-6FD50635BE94}"/>
+              </a:ext>
+            </a:extLst>
+          </p:cNvPr>
+          <p:cNvPicPr>
+            <a:picLocks noChangeAspect="1"/>
+          </p:cNvPicPr>
+          <p:nvPr/>
+        </p:nvPicPr>
+        <p:blipFill>
+          <a:blip r:embed="rId3"/>
+          <a:stretch>
+            <a:fillRect/>
+          </a:stretch>
+        </p:blipFill>
+        <p:spPr>
+          <a:xfrm>
+            <a:off x="299369" y="3869458"/>
+            <a:ext cx="2543530" cy="1400370"/>
+          </a:xfrm>
+          <a:prstGeom prst="rect">
+            <a:avLst/>
+          </a:prstGeom>
+        </p:spPr>
+      </p:pic>
+    </p:spTree>
+    <p:extLst>
+      <p:ext uri="{BB962C8B-B14F-4D97-AF65-F5344CB8AC3E}">
+        <p14:creationId xmlns:p14="http://schemas.microsoft.com/office/powerpoint/2010/main" val="1533369223"/>
+      </p:ext>
+    </p:extLst>
+  </p:cSld>
+  <p:clrMapOvr>
+    <a:masterClrMapping/>
+  </p:clrMapOvr>
+</p:sld>
+</file>
+
+<file path=ppt/slides/slide4.xml><?xml version="1.0" encoding="utf-8"?>
+<p:sld xmlns:a="http://schemas.openxmlformats.org/drawingml/2006/main" xmlns:r="http://schemas.openxmlformats.org/officeDocument/2006/relationships" xmlns:p="http://schemas.openxmlformats.org/presentationml/2006/main">
+  <p:cSld>
+    <p:spTree>
+      <p:nvGrpSpPr>
+        <p:cNvPr id="1" name="">
+          <a:extLst>
+            <a:ext uri="{FF2B5EF4-FFF2-40B4-BE49-F238E27FC236}">
+              <a16:creationId xmlns:a16="http://schemas.microsoft.com/office/drawing/2014/main" id="{9B7830FB-4678-AB4C-10D4-050BF337A8FE}"/>
+            </a:ext>
+          </a:extLst>
+        </p:cNvPr>
+        <p:cNvGrpSpPr/>
+        <p:nvPr/>
+      </p:nvGrpSpPr>
+      <p:grpSpPr>
+        <a:xfrm>
+          <a:off x="0" y="0"/>
+          <a:ext cx="0" cy="0"/>
+          <a:chOff x="0" y="0"/>
+          <a:chExt cx="0" cy="0"/>
+        </a:xfrm>
+      </p:grpSpPr>
+      <p:sp>
+        <p:nvSpPr>
+          <p:cNvPr id="3" name="TextBox 2">
+            <a:extLst>
+              <a:ext uri="{FF2B5EF4-FFF2-40B4-BE49-F238E27FC236}">
+                <a16:creationId xmlns:a16="http://schemas.microsoft.com/office/drawing/2014/main" id="{1888759C-EF4B-1C13-E928-F10E7C0D4078}"/>
+              </a:ext>
+            </a:extLst>
+          </p:cNvPr>
+          <p:cNvSpPr txBox="1"/>
+          <p:nvPr/>
+        </p:nvSpPr>
+        <p:spPr>
+          <a:xfrm>
+            <a:off x="217714" y="255046"/>
+            <a:ext cx="11756571" cy="3056093"/>
+          </a:xfrm>
+          <a:prstGeom prst="rect">
+            <a:avLst/>
+          </a:prstGeom>
+          <a:noFill/>
+        </p:spPr>
+        <p:txBody>
+          <a:bodyPr wrap="square">
+            <a:spAutoFit/>
+          </a:bodyPr>
+          <a:lstStyle/>
+          <a:p>
+            <a:pPr>
+              <a:lnSpc>
+                <a:spcPct val="150000"/>
+              </a:lnSpc>
+              <a:buNone/>
+            </a:pPr>
+            <a:r>
+              <a:rPr kumimoji="0" lang="en-US" altLang="en-US" sz="1300" b="0" i="0" u="none" strike="noStrike" cap="none" normalizeH="0" baseline="0">
+                <a:ln>
+                  <a:noFill/>
+                </a:ln>
+                <a:solidFill>
+                  <a:schemeClr val="tx1"/>
+                </a:solidFill>
+                <a:effectLst/>
+                <a:latin typeface="Arial" panose="020B0604020202020204" pitchFamily="34" charset="0"/>
+              </a:rPr>
+              <a:t>4️⃣ </a:t>
+            </a:r>
+            <a:r>
+              <a:rPr kumimoji="0" lang="en-US" altLang="en-US" sz="1300" b="1" i="0" u="none" strike="noStrike" cap="none" normalizeH="0" baseline="0">
+                <a:ln>
+                  <a:noFill/>
+                </a:ln>
+                <a:solidFill>
+                  <a:srgbClr val="FF0000"/>
+                </a:solidFill>
+                <a:effectLst/>
+                <a:latin typeface="Arial" panose="020B0604020202020204" pitchFamily="34" charset="0"/>
+              </a:rPr>
+              <a:t>php artisan db:seed</a:t>
+            </a:r>
+            <a:endParaRPr kumimoji="0" lang="az-Latn-AZ" altLang="en-US" sz="1300" b="1" i="0" u="none" strike="noStrike" cap="none" normalizeH="0" baseline="0">
+              <a:ln>
+                <a:noFill/>
+              </a:ln>
+              <a:solidFill>
+                <a:srgbClr val="FF0000"/>
+              </a:solidFill>
+              <a:effectLst/>
+              <a:latin typeface="Arial" panose="020B0604020202020204" pitchFamily="34" charset="0"/>
+            </a:endParaRPr>
+          </a:p>
+          <a:p>
+            <a:pPr>
+              <a:lnSpc>
+                <a:spcPct val="150000"/>
+              </a:lnSpc>
+              <a:buNone/>
+            </a:pPr>
+            <a:endParaRPr kumimoji="0" lang="en-US" altLang="en-US" sz="1300" b="0" i="0" u="none" strike="noStrike" cap="none" normalizeH="0" baseline="0">
+              <a:ln>
+                <a:noFill/>
+              </a:ln>
+              <a:solidFill>
+                <a:schemeClr val="tx1"/>
+              </a:solidFill>
+              <a:effectLst/>
+              <a:latin typeface="Arial" panose="020B0604020202020204" pitchFamily="34" charset="0"/>
+            </a:endParaRPr>
+          </a:p>
+          <a:p>
+            <a:pPr>
+              <a:lnSpc>
+                <a:spcPct val="150000"/>
+              </a:lnSpc>
+              <a:buNone/>
+            </a:pPr>
+            <a:r>
+              <a:rPr kumimoji="0" lang="en-US" altLang="en-US" sz="1300" b="0" i="0" u="none" strike="noStrike" cap="none" normalizeH="0" baseline="0">
+                <a:ln>
+                  <a:noFill/>
+                </a:ln>
+                <a:solidFill>
+                  <a:schemeClr val="tx1"/>
+                </a:solidFill>
+                <a:effectLst/>
+                <a:latin typeface="Arial" panose="020B0604020202020204" pitchFamily="34" charset="0"/>
+              </a:rPr>
+              <a:t>Bu əmr </a:t>
+            </a:r>
+            <a:r>
+              <a:rPr kumimoji="0" lang="en-US" altLang="en-US" sz="1300" b="1" i="0" u="none" strike="noStrike" cap="none" normalizeH="0" baseline="0">
+                <a:ln>
+                  <a:noFill/>
+                </a:ln>
+                <a:solidFill>
+                  <a:schemeClr val="tx1"/>
+                </a:solidFill>
+                <a:effectLst/>
+                <a:latin typeface="Arial" panose="020B0604020202020204" pitchFamily="34" charset="0"/>
+              </a:rPr>
+              <a:t>Laravel DatabaseSeeder </a:t>
+            </a:r>
+            <a:r>
+              <a:rPr kumimoji="0" lang="en-US" altLang="en-US" sz="1300" b="0" i="0" u="none" strike="noStrike" cap="none" normalizeH="0" baseline="0">
+                <a:ln>
+                  <a:noFill/>
+                </a:ln>
+                <a:solidFill>
+                  <a:schemeClr val="tx1"/>
+                </a:solidFill>
+                <a:effectLst/>
+                <a:latin typeface="Arial" panose="020B0604020202020204" pitchFamily="34" charset="0"/>
+              </a:rPr>
+              <a:t>klasını işə salır.</a:t>
+            </a:r>
+          </a:p>
+          <a:p>
+            <a:pPr>
+              <a:lnSpc>
+                <a:spcPct val="150000"/>
+              </a:lnSpc>
+              <a:buNone/>
+            </a:pPr>
+            <a:endParaRPr kumimoji="0" lang="en-US" altLang="en-US" sz="1300" b="0" i="0" u="none" strike="noStrike" cap="none" normalizeH="0" baseline="0">
+              <a:ln>
+                <a:noFill/>
+              </a:ln>
+              <a:solidFill>
+                <a:schemeClr val="tx1"/>
+              </a:solidFill>
+              <a:effectLst/>
+              <a:latin typeface="Arial" panose="020B0604020202020204" pitchFamily="34" charset="0"/>
+            </a:endParaRPr>
+          </a:p>
+          <a:p>
+            <a:pPr>
+              <a:lnSpc>
+                <a:spcPct val="150000"/>
+              </a:lnSpc>
+              <a:buNone/>
+            </a:pPr>
+            <a:r>
+              <a:rPr kumimoji="0" lang="en-US" altLang="en-US" sz="1300" b="0" i="0" u="none" strike="noStrike" cap="none" normalizeH="0" baseline="0">
+                <a:ln>
+                  <a:noFill/>
+                </a:ln>
+                <a:solidFill>
+                  <a:schemeClr val="tx1"/>
+                </a:solidFill>
+                <a:effectLst/>
+                <a:latin typeface="Arial" panose="020B0604020202020204" pitchFamily="34" charset="0"/>
+              </a:rPr>
+              <a:t>Oradan da </a:t>
+            </a:r>
+            <a:r>
+              <a:rPr kumimoji="0" lang="en-US" altLang="en-US" sz="1300" b="1" i="0" u="none" strike="noStrike" cap="none" normalizeH="0" baseline="0">
+                <a:ln>
+                  <a:noFill/>
+                </a:ln>
+                <a:solidFill>
+                  <a:schemeClr val="tx1"/>
+                </a:solidFill>
+                <a:effectLst/>
+                <a:latin typeface="Arial" panose="020B0604020202020204" pitchFamily="34" charset="0"/>
+              </a:rPr>
+              <a:t>PostSeeder::class </a:t>
+            </a:r>
+            <a:r>
+              <a:rPr kumimoji="0" lang="en-US" altLang="en-US" sz="1300" b="0" i="0" u="none" strike="noStrike" cap="none" normalizeH="0" baseline="0">
+                <a:ln>
+                  <a:noFill/>
+                </a:ln>
+                <a:solidFill>
+                  <a:schemeClr val="tx1"/>
+                </a:solidFill>
+                <a:effectLst/>
+                <a:latin typeface="Arial" panose="020B0604020202020204" pitchFamily="34" charset="0"/>
+              </a:rPr>
+              <a:t>çağırılır.</a:t>
+            </a:r>
+          </a:p>
+          <a:p>
+            <a:pPr>
+              <a:lnSpc>
+                <a:spcPct val="150000"/>
+              </a:lnSpc>
+              <a:buNone/>
+            </a:pPr>
+            <a:endParaRPr kumimoji="0" lang="en-US" altLang="en-US" sz="1300" b="0" i="0" u="none" strike="noStrike" cap="none" normalizeH="0" baseline="0">
+              <a:ln>
+                <a:noFill/>
+              </a:ln>
+              <a:solidFill>
+                <a:schemeClr val="tx1"/>
+              </a:solidFill>
+              <a:effectLst/>
+              <a:latin typeface="Arial" panose="020B0604020202020204" pitchFamily="34" charset="0"/>
+            </a:endParaRPr>
+          </a:p>
+          <a:p>
+            <a:pPr>
+              <a:lnSpc>
+                <a:spcPct val="150000"/>
+              </a:lnSpc>
+              <a:buNone/>
+            </a:pPr>
+            <a:r>
+              <a:rPr kumimoji="0" lang="en-US" altLang="en-US" sz="1300" b="0" i="0" u="none" strike="noStrike" cap="none" normalizeH="0" baseline="0">
+                <a:ln>
+                  <a:noFill/>
+                </a:ln>
+                <a:solidFill>
+                  <a:schemeClr val="tx1"/>
+                </a:solidFill>
+                <a:effectLst/>
+                <a:latin typeface="Arial" panose="020B0604020202020204" pitchFamily="34" charset="0"/>
+              </a:rPr>
+              <a:t>Və nəticədə məlumat posts cədvəlinə yazılır.</a:t>
+            </a:r>
+          </a:p>
+          <a:p>
+            <a:pPr>
+              <a:lnSpc>
+                <a:spcPct val="150000"/>
+              </a:lnSpc>
+              <a:buNone/>
+            </a:pPr>
+            <a:endParaRPr kumimoji="0" lang="en-US" altLang="en-US" sz="1300" b="0" i="0" u="none" strike="noStrike" cap="none" normalizeH="0" baseline="0">
+              <a:ln>
+                <a:noFill/>
+              </a:ln>
+              <a:solidFill>
+                <a:schemeClr val="tx1"/>
+              </a:solidFill>
+              <a:effectLst/>
+              <a:latin typeface="Arial" panose="020B0604020202020204" pitchFamily="34" charset="0"/>
+            </a:endParaRPr>
+          </a:p>
+          <a:p>
+            <a:pPr>
+              <a:lnSpc>
+                <a:spcPct val="150000"/>
+              </a:lnSpc>
+              <a:buNone/>
+            </a:pPr>
+            <a:r>
+              <a:rPr kumimoji="0" lang="en-US" altLang="en-US" sz="1300" b="0" i="0" u="none" strike="noStrike" cap="none" normalizeH="0" baseline="0">
+                <a:ln>
+                  <a:noFill/>
+                </a:ln>
+                <a:solidFill>
+                  <a:schemeClr val="tx1"/>
+                </a:solidFill>
+                <a:effectLst/>
+                <a:latin typeface="Arial" panose="020B0604020202020204" pitchFamily="34" charset="0"/>
+              </a:rPr>
+              <a:t>Nə vaxt istifadə olunur?</a:t>
+            </a:r>
+          </a:p>
+          <a:p>
+            <a:pPr>
+              <a:lnSpc>
+                <a:spcPct val="150000"/>
+              </a:lnSpc>
+              <a:buNone/>
+            </a:pPr>
+            <a:r>
+              <a:rPr kumimoji="0" lang="en-US" altLang="en-US" sz="1300" b="0" i="0" u="none" strike="noStrike" cap="none" normalizeH="0" baseline="0">
+                <a:ln>
+                  <a:noFill/>
+                </a:ln>
+                <a:solidFill>
+                  <a:schemeClr val="tx1"/>
+                </a:solidFill>
+                <a:effectLst/>
+                <a:latin typeface="Arial" panose="020B0604020202020204" pitchFamily="34" charset="0"/>
+              </a:rPr>
+              <a:t>Lokal testlər üçün verilənlər bazasını məlumatla doldurmaq istədikdə.</a:t>
+            </a:r>
+          </a:p>
+        </p:txBody>
+      </p:sp>
+    </p:spTree>
+    <p:extLst>
+      <p:ext uri="{BB962C8B-B14F-4D97-AF65-F5344CB8AC3E}">
+        <p14:creationId xmlns:p14="http://schemas.microsoft.com/office/powerpoint/2010/main" val="2305340048"/>
+      </p:ext>
+    </p:extLst>
+  </p:cSld>
+  <p:clrMapOvr>
+    <a:masterClrMapping/>
+  </p:clrMapOvr>
+</p:sld>
+</file>
+
+<file path=ppt/slides/slide5.xml><?xml version="1.0" encoding="utf-8"?>
+<p:sld xmlns:a="http://schemas.openxmlformats.org/drawingml/2006/main" xmlns:r="http://schemas.openxmlformats.org/officeDocument/2006/relationships" xmlns:p="http://schemas.openxmlformats.org/presentationml/2006/main">
+  <p:cSld>
+    <p:spTree>
+      <p:nvGrpSpPr>
+        <p:cNvPr id="1" name="">
+          <a:extLst>
+            <a:ext uri="{FF2B5EF4-FFF2-40B4-BE49-F238E27FC236}">
+              <a16:creationId xmlns:a16="http://schemas.microsoft.com/office/drawing/2014/main" id="{CEC0DB7C-363B-73C3-748C-11FBDADE15A7}"/>
+            </a:ext>
+          </a:extLst>
+        </p:cNvPr>
+        <p:cNvGrpSpPr/>
+        <p:nvPr/>
+      </p:nvGrpSpPr>
+      <p:grpSpPr>
+        <a:xfrm>
+          <a:off x="0" y="0"/>
+          <a:ext cx="0" cy="0"/>
+          <a:chOff x="0" y="0"/>
+          <a:chExt cx="0" cy="0"/>
+        </a:xfrm>
+      </p:grpSpPr>
+      <p:sp>
+        <p:nvSpPr>
+          <p:cNvPr id="3" name="TextBox 2">
+            <a:extLst>
+              <a:ext uri="{FF2B5EF4-FFF2-40B4-BE49-F238E27FC236}">
+                <a16:creationId xmlns:a16="http://schemas.microsoft.com/office/drawing/2014/main" id="{C011FB07-B20D-5052-6044-D3451EC6EE6C}"/>
+              </a:ext>
+            </a:extLst>
+          </p:cNvPr>
+          <p:cNvSpPr txBox="1"/>
+          <p:nvPr/>
+        </p:nvSpPr>
+        <p:spPr>
+          <a:xfrm>
+            <a:off x="217714" y="255046"/>
             <a:ext cx="11756571" cy="355354"/>
           </a:xfrm>
           <a:prstGeom prst="rect">
@@ -3469,10 +5223,828 @@
           </a:p>
         </p:txBody>
       </p:sp>
+      <p:pic>
+        <p:nvPicPr>
+          <p:cNvPr id="4" name="Picture 3">
+            <a:extLst>
+              <a:ext uri="{FF2B5EF4-FFF2-40B4-BE49-F238E27FC236}">
+                <a16:creationId xmlns:a16="http://schemas.microsoft.com/office/drawing/2014/main" id="{21A4E61C-9B46-C7E3-6553-ACAD8A06DB15}"/>
+              </a:ext>
+            </a:extLst>
+          </p:cNvPr>
+          <p:cNvPicPr>
+            <a:picLocks noChangeAspect="1"/>
+          </p:cNvPicPr>
+          <p:nvPr/>
+        </p:nvPicPr>
+        <p:blipFill>
+          <a:blip r:embed="rId2">
+            <a:extLst>
+              <a:ext uri="{28A0092B-C50C-407E-A947-70E740481C1C}">
+                <a14:useLocalDpi xmlns:a14="http://schemas.microsoft.com/office/drawing/2010/main" val="0"/>
+              </a:ext>
+            </a:extLst>
+          </a:blip>
+          <a:stretch>
+            <a:fillRect/>
+          </a:stretch>
+        </p:blipFill>
+        <p:spPr>
+          <a:xfrm>
+            <a:off x="-1" y="144667"/>
+            <a:ext cx="12192000" cy="6568666"/>
+          </a:xfrm>
+          <a:prstGeom prst="rect">
+            <a:avLst/>
+          </a:prstGeom>
+        </p:spPr>
+      </p:pic>
     </p:spTree>
     <p:extLst>
       <p:ext uri="{BB962C8B-B14F-4D97-AF65-F5344CB8AC3E}">
-        <p14:creationId xmlns:p14="http://schemas.microsoft.com/office/powerpoint/2010/main" val="1186759978"/>
+        <p14:creationId xmlns:p14="http://schemas.microsoft.com/office/powerpoint/2010/main" val="1354655279"/>
+      </p:ext>
+    </p:extLst>
+  </p:cSld>
+  <p:clrMapOvr>
+    <a:masterClrMapping/>
+  </p:clrMapOvr>
+</p:sld>
+</file>
+
+<file path=ppt/slides/slide6.xml><?xml version="1.0" encoding="utf-8"?>
+<p:sld xmlns:a="http://schemas.openxmlformats.org/drawingml/2006/main" xmlns:r="http://schemas.openxmlformats.org/officeDocument/2006/relationships" xmlns:p="http://schemas.openxmlformats.org/presentationml/2006/main">
+  <p:cSld>
+    <p:spTree>
+      <p:nvGrpSpPr>
+        <p:cNvPr id="1" name="">
+          <a:extLst>
+            <a:ext uri="{FF2B5EF4-FFF2-40B4-BE49-F238E27FC236}">
+              <a16:creationId xmlns:a16="http://schemas.microsoft.com/office/drawing/2014/main" id="{2008A227-6604-8E94-D8D9-E4603E92651E}"/>
+            </a:ext>
+          </a:extLst>
+        </p:cNvPr>
+        <p:cNvGrpSpPr/>
+        <p:nvPr/>
+      </p:nvGrpSpPr>
+      <p:grpSpPr>
+        <a:xfrm>
+          <a:off x="0" y="0"/>
+          <a:ext cx="0" cy="0"/>
+          <a:chOff x="0" y="0"/>
+          <a:chExt cx="0" cy="0"/>
+        </a:xfrm>
+      </p:grpSpPr>
+      <p:sp>
+        <p:nvSpPr>
+          <p:cNvPr id="3" name="TextBox 2">
+            <a:extLst>
+              <a:ext uri="{FF2B5EF4-FFF2-40B4-BE49-F238E27FC236}">
+                <a16:creationId xmlns:a16="http://schemas.microsoft.com/office/drawing/2014/main" id="{50E00BE5-2AE7-6777-54F2-73D121C84870}"/>
+              </a:ext>
+            </a:extLst>
+          </p:cNvPr>
+          <p:cNvSpPr txBox="1"/>
+          <p:nvPr/>
+        </p:nvSpPr>
+        <p:spPr>
+          <a:xfrm>
+            <a:off x="217714" y="255046"/>
+            <a:ext cx="11756571" cy="355354"/>
+          </a:xfrm>
+          <a:prstGeom prst="rect">
+            <a:avLst/>
+          </a:prstGeom>
+          <a:noFill/>
+        </p:spPr>
+        <p:txBody>
+          <a:bodyPr wrap="square">
+            <a:spAutoFit/>
+          </a:bodyPr>
+          <a:lstStyle/>
+          <a:p>
+            <a:pPr>
+              <a:lnSpc>
+                <a:spcPct val="150000"/>
+              </a:lnSpc>
+              <a:buNone/>
+            </a:pPr>
+            <a:r>
+              <a:rPr kumimoji="0" lang="en-US" altLang="en-US" sz="1300" b="0" i="0" u="none" strike="noStrike" cap="none" normalizeH="0" baseline="0">
+                <a:ln>
+                  <a:noFill/>
+                </a:ln>
+                <a:solidFill>
+                  <a:schemeClr val="tx1"/>
+                </a:solidFill>
+                <a:effectLst/>
+                <a:latin typeface="Arial" panose="020B0604020202020204" pitchFamily="34" charset="0"/>
+              </a:rPr>
+              <a:t>.</a:t>
+            </a:r>
+          </a:p>
+        </p:txBody>
+      </p:sp>
+      <p:pic>
+        <p:nvPicPr>
+          <p:cNvPr id="4" name="Picture 3">
+            <a:extLst>
+              <a:ext uri="{FF2B5EF4-FFF2-40B4-BE49-F238E27FC236}">
+                <a16:creationId xmlns:a16="http://schemas.microsoft.com/office/drawing/2014/main" id="{6BE96750-763D-50C7-C510-40551EB63FEC}"/>
+              </a:ext>
+            </a:extLst>
+          </p:cNvPr>
+          <p:cNvPicPr>
+            <a:picLocks noChangeAspect="1"/>
+          </p:cNvPicPr>
+          <p:nvPr/>
+        </p:nvPicPr>
+        <p:blipFill>
+          <a:blip r:embed="rId2">
+            <a:extLst>
+              <a:ext uri="{28A0092B-C50C-407E-A947-70E740481C1C}">
+                <a14:useLocalDpi xmlns:a14="http://schemas.microsoft.com/office/drawing/2010/main" val="0"/>
+              </a:ext>
+            </a:extLst>
+          </a:blip>
+          <a:stretch>
+            <a:fillRect/>
+          </a:stretch>
+        </p:blipFill>
+        <p:spPr>
+          <a:xfrm>
+            <a:off x="0" y="115584"/>
+            <a:ext cx="12192000" cy="6626832"/>
+          </a:xfrm>
+          <a:prstGeom prst="rect">
+            <a:avLst/>
+          </a:prstGeom>
+        </p:spPr>
+      </p:pic>
+    </p:spTree>
+    <p:extLst>
+      <p:ext uri="{BB962C8B-B14F-4D97-AF65-F5344CB8AC3E}">
+        <p14:creationId xmlns:p14="http://schemas.microsoft.com/office/powerpoint/2010/main" val="788504745"/>
+      </p:ext>
+    </p:extLst>
+  </p:cSld>
+  <p:clrMapOvr>
+    <a:masterClrMapping/>
+  </p:clrMapOvr>
+</p:sld>
+</file>
+
+<file path=ppt/slides/slide7.xml><?xml version="1.0" encoding="utf-8"?>
+<p:sld xmlns:a="http://schemas.openxmlformats.org/drawingml/2006/main" xmlns:r="http://schemas.openxmlformats.org/officeDocument/2006/relationships" xmlns:p="http://schemas.openxmlformats.org/presentationml/2006/main">
+  <p:cSld>
+    <p:spTree>
+      <p:nvGrpSpPr>
+        <p:cNvPr id="1" name="">
+          <a:extLst>
+            <a:ext uri="{FF2B5EF4-FFF2-40B4-BE49-F238E27FC236}">
+              <a16:creationId xmlns:a16="http://schemas.microsoft.com/office/drawing/2014/main" id="{153B7822-9726-825B-0D7E-DB7D7B7C582F}"/>
+            </a:ext>
+          </a:extLst>
+        </p:cNvPr>
+        <p:cNvGrpSpPr/>
+        <p:nvPr/>
+      </p:nvGrpSpPr>
+      <p:grpSpPr>
+        <a:xfrm>
+          <a:off x="0" y="0"/>
+          <a:ext cx="0" cy="0"/>
+          <a:chOff x="0" y="0"/>
+          <a:chExt cx="0" cy="0"/>
+        </a:xfrm>
+      </p:grpSpPr>
+      <p:sp>
+        <p:nvSpPr>
+          <p:cNvPr id="3" name="TextBox 2">
+            <a:extLst>
+              <a:ext uri="{FF2B5EF4-FFF2-40B4-BE49-F238E27FC236}">
+                <a16:creationId xmlns:a16="http://schemas.microsoft.com/office/drawing/2014/main" id="{9ED11BB7-D8E3-98F3-EB27-8AF64DB5F35D}"/>
+              </a:ext>
+            </a:extLst>
+          </p:cNvPr>
+          <p:cNvSpPr txBox="1"/>
+          <p:nvPr/>
+        </p:nvSpPr>
+        <p:spPr>
+          <a:xfrm>
+            <a:off x="217714" y="255046"/>
+            <a:ext cx="11756571" cy="3356175"/>
+          </a:xfrm>
+          <a:prstGeom prst="rect">
+            <a:avLst/>
+          </a:prstGeom>
+          <a:noFill/>
+        </p:spPr>
+        <p:txBody>
+          <a:bodyPr wrap="square">
+            <a:spAutoFit/>
+          </a:bodyPr>
+          <a:lstStyle/>
+          <a:p>
+            <a:pPr>
+              <a:lnSpc>
+                <a:spcPct val="150000"/>
+              </a:lnSpc>
+              <a:buNone/>
+            </a:pPr>
+            <a:r>
+              <a:rPr kumimoji="0" lang="en-US" altLang="en-US" sz="1300" b="1" i="0" u="none" strike="noStrike" cap="none" normalizeH="0" baseline="0">
+                <a:ln>
+                  <a:noFill/>
+                </a:ln>
+                <a:solidFill>
+                  <a:schemeClr val="tx1"/>
+                </a:solidFill>
+                <a:effectLst/>
+                <a:latin typeface="Arial" panose="020B0604020202020204" pitchFamily="34" charset="0"/>
+              </a:rPr>
+              <a:t>Əlavə İmkanlar</a:t>
+            </a:r>
+            <a:r>
+              <a:rPr kumimoji="0" lang="en-US" altLang="en-US" sz="1300" b="0" i="0" u="none" strike="noStrike" cap="none" normalizeH="0" baseline="0">
+                <a:ln>
+                  <a:noFill/>
+                </a:ln>
+                <a:solidFill>
+                  <a:schemeClr val="tx1"/>
+                </a:solidFill>
+                <a:effectLst/>
+                <a:latin typeface="Arial" panose="020B0604020202020204" pitchFamily="34" charset="0"/>
+              </a:rPr>
+              <a:t>: Bütün cədvəlləri yenidən yaradıb, seeder məlumatlarını daxil edir.</a:t>
+            </a:r>
+          </a:p>
+          <a:p>
+            <a:pPr>
+              <a:lnSpc>
+                <a:spcPct val="150000"/>
+              </a:lnSpc>
+              <a:buNone/>
+            </a:pPr>
+            <a:endParaRPr kumimoji="0" lang="en-US" altLang="en-US" sz="1300" b="0" i="0" u="none" strike="noStrike" cap="none" normalizeH="0" baseline="0">
+              <a:ln>
+                <a:noFill/>
+              </a:ln>
+              <a:solidFill>
+                <a:schemeClr val="tx1"/>
+              </a:solidFill>
+              <a:effectLst/>
+              <a:latin typeface="Arial" panose="020B0604020202020204" pitchFamily="34" charset="0"/>
+            </a:endParaRPr>
+          </a:p>
+          <a:p>
+            <a:pPr>
+              <a:lnSpc>
+                <a:spcPct val="150000"/>
+              </a:lnSpc>
+              <a:buNone/>
+            </a:pPr>
+            <a:r>
+              <a:rPr kumimoji="0" lang="en-US" altLang="en-US" sz="1300" b="0" i="0" u="none" strike="noStrike" cap="none" normalizeH="0" baseline="0">
+                <a:ln>
+                  <a:noFill/>
+                </a:ln>
+                <a:solidFill>
+                  <a:schemeClr val="tx1"/>
+                </a:solidFill>
+                <a:effectLst/>
+                <a:latin typeface="Arial" panose="020B0604020202020204" pitchFamily="34" charset="0"/>
+              </a:rPr>
+              <a:t>➕ </a:t>
+            </a:r>
+            <a:r>
+              <a:rPr kumimoji="0" lang="en-US" altLang="en-US" sz="1300" b="1" i="0" u="none" strike="noStrike" cap="none" normalizeH="0" baseline="0">
+                <a:ln>
+                  <a:noFill/>
+                </a:ln>
+                <a:solidFill>
+                  <a:schemeClr val="tx1"/>
+                </a:solidFill>
+                <a:effectLst/>
+                <a:latin typeface="Arial" panose="020B0604020202020204" pitchFamily="34" charset="0"/>
+              </a:rPr>
+              <a:t>Seeder</a:t>
+            </a:r>
+            <a:r>
+              <a:rPr kumimoji="0" lang="en-US" altLang="en-US" sz="1300" b="0" i="0" u="none" strike="noStrike" cap="none" normalizeH="0" baseline="0">
+                <a:ln>
+                  <a:noFill/>
+                </a:ln>
+                <a:solidFill>
+                  <a:schemeClr val="tx1"/>
+                </a:solidFill>
+                <a:effectLst/>
+                <a:latin typeface="Arial" panose="020B0604020202020204" pitchFamily="34" charset="0"/>
+              </a:rPr>
+              <a:t> + </a:t>
+            </a:r>
+            <a:r>
+              <a:rPr kumimoji="0" lang="en-US" altLang="en-US" sz="1300" b="1" i="0" u="none" strike="noStrike" cap="none" normalizeH="0" baseline="0">
+                <a:ln>
+                  <a:noFill/>
+                </a:ln>
+                <a:solidFill>
+                  <a:schemeClr val="tx1"/>
+                </a:solidFill>
+                <a:effectLst/>
+                <a:latin typeface="Arial" panose="020B0604020202020204" pitchFamily="34" charset="0"/>
+              </a:rPr>
+              <a:t>Migration</a:t>
+            </a:r>
+            <a:r>
+              <a:rPr kumimoji="0" lang="en-US" altLang="en-US" sz="1300" b="0" i="0" u="none" strike="noStrike" cap="none" normalizeH="0" baseline="0">
+                <a:ln>
+                  <a:noFill/>
+                </a:ln>
+                <a:solidFill>
+                  <a:schemeClr val="tx1"/>
+                </a:solidFill>
+                <a:effectLst/>
+                <a:latin typeface="Arial" panose="020B0604020202020204" pitchFamily="34" charset="0"/>
+              </a:rPr>
+              <a:t> birlikdə: </a:t>
+            </a:r>
+            <a:r>
+              <a:rPr kumimoji="0" lang="en-US" altLang="en-US" sz="1300" b="1" i="0" u="none" strike="noStrike" cap="none" normalizeH="0" baseline="0">
+                <a:ln>
+                  <a:noFill/>
+                </a:ln>
+                <a:solidFill>
+                  <a:srgbClr val="FF0000"/>
+                </a:solidFill>
+                <a:effectLst/>
+                <a:latin typeface="Arial" panose="020B0604020202020204" pitchFamily="34" charset="0"/>
+              </a:rPr>
+              <a:t>php artisan migrate:fresh --seed</a:t>
+            </a:r>
+          </a:p>
+          <a:p>
+            <a:pPr>
+              <a:lnSpc>
+                <a:spcPct val="150000"/>
+              </a:lnSpc>
+              <a:buNone/>
+            </a:pPr>
+            <a:endParaRPr kumimoji="0" lang="en-US" altLang="en-US" sz="1300" b="0" i="0" u="none" strike="noStrike" cap="none" normalizeH="0" baseline="0">
+              <a:ln>
+                <a:noFill/>
+              </a:ln>
+              <a:solidFill>
+                <a:schemeClr val="tx1"/>
+              </a:solidFill>
+              <a:effectLst/>
+              <a:latin typeface="Arial" panose="020B0604020202020204" pitchFamily="34" charset="0"/>
+            </a:endParaRPr>
+          </a:p>
+          <a:p>
+            <a:pPr>
+              <a:lnSpc>
+                <a:spcPct val="150000"/>
+              </a:lnSpc>
+              <a:buNone/>
+            </a:pPr>
+            <a:endParaRPr kumimoji="0" lang="en-US" altLang="en-US" sz="1300" b="0" i="0" u="none" strike="noStrike" cap="none" normalizeH="0" baseline="0">
+              <a:ln>
+                <a:noFill/>
+              </a:ln>
+              <a:solidFill>
+                <a:schemeClr val="tx1"/>
+              </a:solidFill>
+              <a:effectLst/>
+              <a:latin typeface="Arial" panose="020B0604020202020204" pitchFamily="34" charset="0"/>
+            </a:endParaRPr>
+          </a:p>
+          <a:p>
+            <a:pPr>
+              <a:lnSpc>
+                <a:spcPct val="150000"/>
+              </a:lnSpc>
+              <a:buNone/>
+            </a:pPr>
+            <a:endParaRPr kumimoji="0" lang="en-US" altLang="en-US" sz="1300" b="0" i="0" u="none" strike="noStrike" cap="none" normalizeH="0" baseline="0">
+              <a:ln>
+                <a:noFill/>
+              </a:ln>
+              <a:solidFill>
+                <a:schemeClr val="tx1"/>
+              </a:solidFill>
+              <a:effectLst/>
+              <a:latin typeface="Arial" panose="020B0604020202020204" pitchFamily="34" charset="0"/>
+            </a:endParaRPr>
+          </a:p>
+          <a:p>
+            <a:pPr>
+              <a:lnSpc>
+                <a:spcPct val="150000"/>
+              </a:lnSpc>
+              <a:buNone/>
+            </a:pPr>
+            <a:endParaRPr kumimoji="0" lang="en-US" altLang="en-US" sz="1300" b="0" i="0" u="none" strike="noStrike" cap="none" normalizeH="0" baseline="0">
+              <a:ln>
+                <a:noFill/>
+              </a:ln>
+              <a:solidFill>
+                <a:schemeClr val="tx1"/>
+              </a:solidFill>
+              <a:effectLst/>
+              <a:latin typeface="Arial" panose="020B0604020202020204" pitchFamily="34" charset="0"/>
+            </a:endParaRPr>
+          </a:p>
+          <a:p>
+            <a:pPr>
+              <a:lnSpc>
+                <a:spcPct val="150000"/>
+              </a:lnSpc>
+              <a:buNone/>
+            </a:pPr>
+            <a:endParaRPr kumimoji="0" lang="en-US" altLang="en-US" sz="1300" b="0" i="0" u="none" strike="noStrike" cap="none" normalizeH="0" baseline="0">
+              <a:ln>
+                <a:noFill/>
+              </a:ln>
+              <a:solidFill>
+                <a:schemeClr val="tx1"/>
+              </a:solidFill>
+              <a:effectLst/>
+              <a:latin typeface="Arial" panose="020B0604020202020204" pitchFamily="34" charset="0"/>
+            </a:endParaRPr>
+          </a:p>
+          <a:p>
+            <a:pPr>
+              <a:lnSpc>
+                <a:spcPct val="150000"/>
+              </a:lnSpc>
+              <a:buNone/>
+            </a:pPr>
+            <a:r>
+              <a:rPr kumimoji="0" lang="en-US" altLang="en-US" sz="1300" b="1" i="0" u="none" strike="noStrike" cap="none" normalizeH="0" baseline="0">
+                <a:ln>
+                  <a:noFill/>
+                </a:ln>
+                <a:solidFill>
+                  <a:schemeClr val="tx1"/>
+                </a:solidFill>
+                <a:effectLst/>
+                <a:latin typeface="Arial" panose="020B0604020202020204" pitchFamily="34" charset="0"/>
+              </a:rPr>
+              <a:t>BONUS</a:t>
+            </a:r>
+            <a:r>
+              <a:rPr kumimoji="0" lang="en-US" altLang="en-US" sz="1300" b="0" i="0" u="none" strike="noStrike" cap="none" normalizeH="0" baseline="0">
+                <a:ln>
+                  <a:noFill/>
+                </a:ln>
+                <a:solidFill>
+                  <a:schemeClr val="tx1"/>
+                </a:solidFill>
+                <a:effectLst/>
+                <a:latin typeface="Arial" panose="020B0604020202020204" pitchFamily="34" charset="0"/>
+              </a:rPr>
+              <a:t>: Faker ilə daha real məlumat</a:t>
+            </a:r>
+          </a:p>
+          <a:p>
+            <a:pPr>
+              <a:lnSpc>
+                <a:spcPct val="150000"/>
+              </a:lnSpc>
+              <a:buNone/>
+            </a:pPr>
+            <a:r>
+              <a:rPr kumimoji="0" lang="en-US" altLang="en-US" sz="1300" b="0" i="0" u="none" strike="noStrike" cap="none" normalizeH="0" baseline="0">
+                <a:ln>
+                  <a:noFill/>
+                </a:ln>
+                <a:solidFill>
+                  <a:schemeClr val="tx1"/>
+                </a:solidFill>
+                <a:effectLst/>
+                <a:latin typeface="Arial" panose="020B0604020202020204" pitchFamily="34" charset="0"/>
+              </a:rPr>
+              <a:t>Əgər </a:t>
+            </a:r>
+            <a:r>
+              <a:rPr kumimoji="0" lang="en-US" altLang="en-US" sz="1300" b="1" i="0" u="none" strike="noStrike" cap="none" normalizeH="0" baseline="0">
+                <a:ln>
+                  <a:noFill/>
+                </a:ln>
+                <a:solidFill>
+                  <a:schemeClr val="tx1"/>
+                </a:solidFill>
+                <a:effectLst/>
+                <a:latin typeface="Arial" panose="020B0604020202020204" pitchFamily="34" charset="0"/>
+              </a:rPr>
+              <a:t>Str::random() </a:t>
+            </a:r>
+            <a:r>
+              <a:rPr kumimoji="0" lang="en-US" altLang="en-US" sz="1300" b="0" i="0" u="none" strike="noStrike" cap="none" normalizeH="0" baseline="0">
+                <a:ln>
+                  <a:noFill/>
+                </a:ln>
+                <a:solidFill>
+                  <a:schemeClr val="tx1"/>
+                </a:solidFill>
+                <a:effectLst/>
+                <a:latin typeface="Arial" panose="020B0604020202020204" pitchFamily="34" charset="0"/>
+              </a:rPr>
+              <a:t>yerinə daha real məlumatlar istəyirsinizsə:</a:t>
+            </a:r>
+          </a:p>
+          <a:p>
+            <a:pPr>
+              <a:lnSpc>
+                <a:spcPct val="150000"/>
+              </a:lnSpc>
+              <a:buNone/>
+            </a:pPr>
+            <a:endParaRPr kumimoji="0" lang="en-US" altLang="en-US" sz="1300" b="0" i="0" u="none" strike="noStrike" cap="none" normalizeH="0" baseline="0">
+              <a:ln>
+                <a:noFill/>
+              </a:ln>
+              <a:solidFill>
+                <a:schemeClr val="tx1"/>
+              </a:solidFill>
+              <a:effectLst/>
+              <a:latin typeface="Arial" panose="020B0604020202020204" pitchFamily="34" charset="0"/>
+            </a:endParaRPr>
+          </a:p>
+        </p:txBody>
+      </p:sp>
+      <p:pic>
+        <p:nvPicPr>
+          <p:cNvPr id="4" name="Picture 3">
+            <a:extLst>
+              <a:ext uri="{FF2B5EF4-FFF2-40B4-BE49-F238E27FC236}">
+                <a16:creationId xmlns:a16="http://schemas.microsoft.com/office/drawing/2014/main" id="{5E6D049C-8748-5B7F-649E-5EE66D952FC8}"/>
+              </a:ext>
+            </a:extLst>
+          </p:cNvPr>
+          <p:cNvPicPr>
+            <a:picLocks noChangeAspect="1"/>
+          </p:cNvPicPr>
+          <p:nvPr/>
+        </p:nvPicPr>
+        <p:blipFill>
+          <a:blip r:embed="rId2"/>
+          <a:stretch>
+            <a:fillRect/>
+          </a:stretch>
+        </p:blipFill>
+        <p:spPr>
+          <a:xfrm>
+            <a:off x="293669" y="3611221"/>
+            <a:ext cx="3772426" cy="2524477"/>
+          </a:xfrm>
+          <a:prstGeom prst="rect">
+            <a:avLst/>
+          </a:prstGeom>
+        </p:spPr>
+      </p:pic>
+    </p:spTree>
+    <p:extLst>
+      <p:ext uri="{BB962C8B-B14F-4D97-AF65-F5344CB8AC3E}">
+        <p14:creationId xmlns:p14="http://schemas.microsoft.com/office/powerpoint/2010/main" val="3605110812"/>
+      </p:ext>
+    </p:extLst>
+  </p:cSld>
+  <p:clrMapOvr>
+    <a:masterClrMapping/>
+  </p:clrMapOvr>
+</p:sld>
+</file>
+
+<file path=ppt/slides/slide8.xml><?xml version="1.0" encoding="utf-8"?>
+<p:sld xmlns:a="http://schemas.openxmlformats.org/drawingml/2006/main" xmlns:r="http://schemas.openxmlformats.org/officeDocument/2006/relationships" xmlns:p="http://schemas.openxmlformats.org/presentationml/2006/main">
+  <p:cSld>
+    <p:spTree>
+      <p:nvGrpSpPr>
+        <p:cNvPr id="1" name="">
+          <a:extLst>
+            <a:ext uri="{FF2B5EF4-FFF2-40B4-BE49-F238E27FC236}">
+              <a16:creationId xmlns:a16="http://schemas.microsoft.com/office/drawing/2014/main" id="{1EE148D6-7956-3C47-838C-8B09B6678D05}"/>
+            </a:ext>
+          </a:extLst>
+        </p:cNvPr>
+        <p:cNvGrpSpPr/>
+        <p:nvPr/>
+      </p:nvGrpSpPr>
+      <p:grpSpPr>
+        <a:xfrm>
+          <a:off x="0" y="0"/>
+          <a:ext cx="0" cy="0"/>
+          <a:chOff x="0" y="0"/>
+          <a:chExt cx="0" cy="0"/>
+        </a:xfrm>
+      </p:grpSpPr>
+      <p:sp>
+        <p:nvSpPr>
+          <p:cNvPr id="3" name="TextBox 2">
+            <a:extLst>
+              <a:ext uri="{FF2B5EF4-FFF2-40B4-BE49-F238E27FC236}">
+                <a16:creationId xmlns:a16="http://schemas.microsoft.com/office/drawing/2014/main" id="{20DBA3BA-8DEE-4EFA-F5DA-0BB179516E3D}"/>
+              </a:ext>
+            </a:extLst>
+          </p:cNvPr>
+          <p:cNvSpPr txBox="1"/>
+          <p:nvPr/>
+        </p:nvSpPr>
+        <p:spPr>
+          <a:xfrm>
+            <a:off x="217714" y="255046"/>
+            <a:ext cx="11756571" cy="355354"/>
+          </a:xfrm>
+          <a:prstGeom prst="rect">
+            <a:avLst/>
+          </a:prstGeom>
+          <a:noFill/>
+        </p:spPr>
+        <p:txBody>
+          <a:bodyPr wrap="square">
+            <a:spAutoFit/>
+          </a:bodyPr>
+          <a:lstStyle/>
+          <a:p>
+            <a:pPr>
+              <a:lnSpc>
+                <a:spcPct val="150000"/>
+              </a:lnSpc>
+              <a:buNone/>
+            </a:pPr>
+            <a:r>
+              <a:rPr kumimoji="0" lang="en-US" altLang="en-US" sz="1300" b="0" i="0" u="none" strike="noStrike" cap="none" normalizeH="0" baseline="0">
+                <a:ln>
+                  <a:noFill/>
+                </a:ln>
+                <a:solidFill>
+                  <a:schemeClr val="tx1"/>
+                </a:solidFill>
+                <a:effectLst/>
+                <a:latin typeface="Arial" panose="020B0604020202020204" pitchFamily="34" charset="0"/>
+              </a:rPr>
+              <a:t>.</a:t>
+            </a:r>
+          </a:p>
+        </p:txBody>
+      </p:sp>
+      <p:pic>
+        <p:nvPicPr>
+          <p:cNvPr id="4" name="Picture 3">
+            <a:extLst>
+              <a:ext uri="{FF2B5EF4-FFF2-40B4-BE49-F238E27FC236}">
+                <a16:creationId xmlns:a16="http://schemas.microsoft.com/office/drawing/2014/main" id="{9B2E9CB2-82A7-A3C2-5C59-3945BF8C000C}"/>
+              </a:ext>
+            </a:extLst>
+          </p:cNvPr>
+          <p:cNvPicPr>
+            <a:picLocks noChangeAspect="1"/>
+          </p:cNvPicPr>
+          <p:nvPr/>
+        </p:nvPicPr>
+        <p:blipFill>
+          <a:blip r:embed="rId2"/>
+          <a:stretch>
+            <a:fillRect/>
+          </a:stretch>
+        </p:blipFill>
+        <p:spPr>
+          <a:xfrm>
+            <a:off x="3794607" y="0"/>
+            <a:ext cx="8397393" cy="6858000"/>
+          </a:xfrm>
+          <a:prstGeom prst="rect">
+            <a:avLst/>
+          </a:prstGeom>
+        </p:spPr>
+      </p:pic>
+    </p:spTree>
+    <p:extLst>
+      <p:ext uri="{BB962C8B-B14F-4D97-AF65-F5344CB8AC3E}">
+        <p14:creationId xmlns:p14="http://schemas.microsoft.com/office/powerpoint/2010/main" val="2893143784"/>
+      </p:ext>
+    </p:extLst>
+  </p:cSld>
+  <p:clrMapOvr>
+    <a:masterClrMapping/>
+  </p:clrMapOvr>
+</p:sld>
+</file>
+
+<file path=ppt/slides/slide9.xml><?xml version="1.0" encoding="utf-8"?>
+<p:sld xmlns:a="http://schemas.openxmlformats.org/drawingml/2006/main" xmlns:r="http://schemas.openxmlformats.org/officeDocument/2006/relationships" xmlns:p="http://schemas.openxmlformats.org/presentationml/2006/main">
+  <p:cSld>
+    <p:spTree>
+      <p:nvGrpSpPr>
+        <p:cNvPr id="1" name="">
+          <a:extLst>
+            <a:ext uri="{FF2B5EF4-FFF2-40B4-BE49-F238E27FC236}">
+              <a16:creationId xmlns:a16="http://schemas.microsoft.com/office/drawing/2014/main" id="{1AF181FC-2F21-9B83-5176-6C735AF790CC}"/>
+            </a:ext>
+          </a:extLst>
+        </p:cNvPr>
+        <p:cNvGrpSpPr/>
+        <p:nvPr/>
+      </p:nvGrpSpPr>
+      <p:grpSpPr>
+        <a:xfrm>
+          <a:off x="0" y="0"/>
+          <a:ext cx="0" cy="0"/>
+          <a:chOff x="0" y="0"/>
+          <a:chExt cx="0" cy="0"/>
+        </a:xfrm>
+      </p:grpSpPr>
+      <p:sp>
+        <p:nvSpPr>
+          <p:cNvPr id="3" name="TextBox 2">
+            <a:extLst>
+              <a:ext uri="{FF2B5EF4-FFF2-40B4-BE49-F238E27FC236}">
+                <a16:creationId xmlns:a16="http://schemas.microsoft.com/office/drawing/2014/main" id="{CA0CC435-89CE-D3BD-2725-7C25AAAC6A37}"/>
+              </a:ext>
+            </a:extLst>
+          </p:cNvPr>
+          <p:cNvSpPr txBox="1"/>
+          <p:nvPr/>
+        </p:nvSpPr>
+        <p:spPr>
+          <a:xfrm>
+            <a:off x="217714" y="255046"/>
+            <a:ext cx="11756571" cy="355354"/>
+          </a:xfrm>
+          <a:prstGeom prst="rect">
+            <a:avLst/>
+          </a:prstGeom>
+          <a:noFill/>
+        </p:spPr>
+        <p:txBody>
+          <a:bodyPr wrap="square">
+            <a:spAutoFit/>
+          </a:bodyPr>
+          <a:lstStyle/>
+          <a:p>
+            <a:pPr>
+              <a:lnSpc>
+                <a:spcPct val="150000"/>
+              </a:lnSpc>
+              <a:buNone/>
+            </a:pPr>
+            <a:r>
+              <a:rPr kumimoji="0" lang="en-US" altLang="en-US" sz="1300" b="0" i="0" u="none" strike="noStrike" cap="none" normalizeH="0" baseline="0">
+                <a:ln>
+                  <a:noFill/>
+                </a:ln>
+                <a:solidFill>
+                  <a:schemeClr val="tx1"/>
+                </a:solidFill>
+                <a:effectLst/>
+                <a:latin typeface="Arial" panose="020B0604020202020204" pitchFamily="34" charset="0"/>
+              </a:rPr>
+              <a:t>.</a:t>
+            </a:r>
+          </a:p>
+        </p:txBody>
+      </p:sp>
+      <p:pic>
+        <p:nvPicPr>
+          <p:cNvPr id="6" name="Picture 5">
+            <a:extLst>
+              <a:ext uri="{FF2B5EF4-FFF2-40B4-BE49-F238E27FC236}">
+                <a16:creationId xmlns:a16="http://schemas.microsoft.com/office/drawing/2014/main" id="{D1570CC0-ADEE-2BF4-2B12-351D25B797AD}"/>
+              </a:ext>
+            </a:extLst>
+          </p:cNvPr>
+          <p:cNvPicPr>
+            <a:picLocks noChangeAspect="1"/>
+          </p:cNvPicPr>
+          <p:nvPr/>
+        </p:nvPicPr>
+        <p:blipFill>
+          <a:blip r:embed="rId2">
+            <a:extLst>
+              <a:ext uri="{28A0092B-C50C-407E-A947-70E740481C1C}">
+                <a14:useLocalDpi xmlns:a14="http://schemas.microsoft.com/office/drawing/2010/main" val="0"/>
+              </a:ext>
+            </a:extLst>
+          </a:blip>
+          <a:stretch>
+            <a:fillRect/>
+          </a:stretch>
+        </p:blipFill>
+        <p:spPr>
+          <a:xfrm>
+            <a:off x="0" y="150692"/>
+            <a:ext cx="12192000" cy="6556615"/>
+          </a:xfrm>
+          <a:prstGeom prst="rect">
+            <a:avLst/>
+          </a:prstGeom>
+        </p:spPr>
+      </p:pic>
+    </p:spTree>
+    <p:extLst>
+      <p:ext uri="{BB962C8B-B14F-4D97-AF65-F5344CB8AC3E}">
+        <p14:creationId xmlns:p14="http://schemas.microsoft.com/office/powerpoint/2010/main" val="2563676489"/>
       </p:ext>
     </p:extLst>
   </p:cSld>

</xml_diff>